<commit_message>
Add database design, STD, UI design
</commit_message>
<xml_diff>
--- a/Documentation v1.0.pptx
+++ b/Documentation v1.0.pptx
@@ -17,6 +17,9 @@
     <p:sldId id="265" r:id="rId11"/>
     <p:sldId id="266" r:id="rId12"/>
     <p:sldId id="267" r:id="rId13"/>
+    <p:sldId id="268" r:id="rId14"/>
+    <p:sldId id="269" r:id="rId15"/>
+    <p:sldId id="270" r:id="rId16"/>
   </p:sldIdLst>
   <p:sldSz cx="12192000" cy="6858000"/>
   <p:notesSz cx="6858000" cy="9144000"/>
@@ -144,7 +147,13 @@
         <p14:section name="Technical Design" id="{B96E9651-B8FB-4290-A28E-7F485BF5A271}">
           <p14:sldIdLst>
             <p14:sldId id="267"/>
+            <p14:sldId id="268"/>
+            <p14:sldId id="269"/>
+            <p14:sldId id="270"/>
           </p14:sldIdLst>
+        </p14:section>
+        <p14:section name="Interface Design" id="{84A4692C-677B-47D6-953F-9ACFACC11C18}">
+          <p14:sldIdLst/>
         </p14:section>
       </p14:sectionLst>
     </p:ext>
@@ -8528,6 +8537,9 @@
             <a:avLst/>
           </a:prstGeom>
           <a:ln>
+            <a:solidFill>
+              <a:srgbClr val="C00000"/>
+            </a:solidFill>
             <a:tailEnd type="triangle"/>
           </a:ln>
         </p:spPr>
@@ -8566,6 +8578,9 @@
             </a:avLst>
           </a:prstGeom>
           <a:ln>
+            <a:solidFill>
+              <a:srgbClr val="C00000"/>
+            </a:solidFill>
             <a:tailEnd type="triangle"/>
           </a:ln>
         </p:spPr>
@@ -8604,6 +8619,9 @@
             </a:avLst>
           </a:prstGeom>
           <a:ln>
+            <a:solidFill>
+              <a:srgbClr val="C00000"/>
+            </a:solidFill>
             <a:tailEnd type="triangle"/>
           </a:ln>
         </p:spPr>
@@ -8642,6 +8660,9 @@
             </a:avLst>
           </a:prstGeom>
           <a:ln>
+            <a:solidFill>
+              <a:srgbClr val="C00000"/>
+            </a:solidFill>
             <a:tailEnd type="triangle"/>
           </a:ln>
         </p:spPr>
@@ -8681,6 +8702,9 @@
             </a:avLst>
           </a:prstGeom>
           <a:ln>
+            <a:solidFill>
+              <a:srgbClr val="C00000"/>
+            </a:solidFill>
             <a:tailEnd type="triangle"/>
           </a:ln>
         </p:spPr>
@@ -8717,6 +8741,9 @@
             <a:avLst/>
           </a:prstGeom>
           <a:ln>
+            <a:solidFill>
+              <a:srgbClr val="C00000"/>
+            </a:solidFill>
             <a:tailEnd type="triangle"/>
           </a:ln>
         </p:spPr>
@@ -8753,6 +8780,9 @@
             <a:avLst/>
           </a:prstGeom>
           <a:ln>
+            <a:solidFill>
+              <a:srgbClr val="C00000"/>
+            </a:solidFill>
             <a:tailEnd type="triangle"/>
           </a:ln>
         </p:spPr>
@@ -8792,6 +8822,9 @@
             </a:avLst>
           </a:prstGeom>
           <a:ln>
+            <a:solidFill>
+              <a:srgbClr val="C00000"/>
+            </a:solidFill>
             <a:tailEnd type="triangle"/>
           </a:ln>
         </p:spPr>
@@ -8828,6 +8861,9 @@
             <a:avLst/>
           </a:prstGeom>
           <a:ln>
+            <a:solidFill>
+              <a:srgbClr val="C00000"/>
+            </a:solidFill>
             <a:tailEnd type="triangle"/>
           </a:ln>
         </p:spPr>
@@ -8851,21 +8887,22 @@
           <p:cNvPr id="39" name="Curved Connector 38"/>
           <p:cNvCxnSpPr>
             <a:stCxn id="9" idx="0"/>
-            <a:endCxn id="7" idx="2"/>
+            <a:endCxn id="7" idx="1"/>
           </p:cNvCxnSpPr>
           <p:nvPr/>
         </p:nvCxnSpPr>
         <p:spPr>
           <a:xfrm rot="5400000" flipH="1" flipV="1">
-            <a:off x="5102894" y="2482240"/>
-            <a:ext cx="906052" cy="4384110"/>
+            <a:off x="4485674" y="2642260"/>
+            <a:ext cx="1363252" cy="3606870"/>
           </a:xfrm>
-          <a:prstGeom prst="curvedConnector3">
-            <a:avLst>
-              <a:gd name="adj1" fmla="val 50000"/>
-            </a:avLst>
+          <a:prstGeom prst="curvedConnector2">
+            <a:avLst/>
           </a:prstGeom>
           <a:ln>
+            <a:solidFill>
+              <a:srgbClr val="C00000"/>
+            </a:solidFill>
             <a:tailEnd type="triangle"/>
           </a:ln>
         </p:spPr>
@@ -8884,10 +8921,3583 @@
           </a:fontRef>
         </p:style>
       </p:cxnSp>
+      <p:sp>
+        <p:nvSpPr>
+          <p:cNvPr id="43" name="Rectangle 42"/>
+          <p:cNvSpPr/>
+          <p:nvPr/>
+        </p:nvSpPr>
+        <p:spPr>
+          <a:xfrm>
+            <a:off x="6948867" y="2375763"/>
+            <a:ext cx="499267" cy="336125"/>
+          </a:xfrm>
+          <a:prstGeom prst="rect">
+            <a:avLst/>
+          </a:prstGeom>
+          <a:solidFill>
+            <a:schemeClr val="bg1">
+              <a:alpha val="73000"/>
+            </a:schemeClr>
+          </a:solidFill>
+        </p:spPr>
+        <p:style>
+          <a:lnRef idx="2">
+            <a:schemeClr val="accent1">
+              <a:shade val="50000"/>
+            </a:schemeClr>
+          </a:lnRef>
+          <a:fillRef idx="1">
+            <a:schemeClr val="accent1"/>
+          </a:fillRef>
+          <a:effectRef idx="0">
+            <a:schemeClr val="accent1"/>
+          </a:effectRef>
+          <a:fontRef idx="minor">
+            <a:schemeClr val="lt1"/>
+          </a:fontRef>
+        </p:style>
+        <p:txBody>
+          <a:bodyPr rtlCol="0" anchor="ctr"/>
+          <a:lstStyle/>
+          <a:p>
+            <a:pPr algn="ctr"/>
+            <a:r>
+              <a:rPr lang="en-US" sz="1200" dirty="0">
+                <a:solidFill>
+                  <a:schemeClr val="accent1">
+                    <a:lumMod val="50000"/>
+                  </a:schemeClr>
+                </a:solidFill>
+              </a:rPr>
+              <a:t>1</a:t>
+            </a:r>
+          </a:p>
+        </p:txBody>
+      </p:sp>
+      <p:sp>
+        <p:nvSpPr>
+          <p:cNvPr id="44" name="Rectangle 43"/>
+          <p:cNvSpPr/>
+          <p:nvPr/>
+        </p:nvSpPr>
+        <p:spPr>
+          <a:xfrm>
+            <a:off x="8724380" y="4645060"/>
+            <a:ext cx="499267" cy="336125"/>
+          </a:xfrm>
+          <a:prstGeom prst="rect">
+            <a:avLst/>
+          </a:prstGeom>
+          <a:solidFill>
+            <a:schemeClr val="bg1">
+              <a:alpha val="73000"/>
+            </a:schemeClr>
+          </a:solidFill>
+        </p:spPr>
+        <p:style>
+          <a:lnRef idx="2">
+            <a:schemeClr val="accent1">
+              <a:shade val="50000"/>
+            </a:schemeClr>
+          </a:lnRef>
+          <a:fillRef idx="1">
+            <a:schemeClr val="accent1"/>
+          </a:fillRef>
+          <a:effectRef idx="0">
+            <a:schemeClr val="accent1"/>
+          </a:effectRef>
+          <a:fontRef idx="minor">
+            <a:schemeClr val="lt1"/>
+          </a:fontRef>
+        </p:style>
+        <p:txBody>
+          <a:bodyPr rtlCol="0" anchor="ctr"/>
+          <a:lstStyle/>
+          <a:p>
+            <a:pPr algn="ctr"/>
+            <a:r>
+              <a:rPr lang="en-US" sz="1200" dirty="0">
+                <a:solidFill>
+                  <a:schemeClr val="accent1">
+                    <a:lumMod val="50000"/>
+                  </a:schemeClr>
+                </a:solidFill>
+              </a:rPr>
+              <a:t>2</a:t>
+            </a:r>
+          </a:p>
+        </p:txBody>
+      </p:sp>
+      <p:sp>
+        <p:nvSpPr>
+          <p:cNvPr id="45" name="Rectangle 44"/>
+          <p:cNvSpPr/>
+          <p:nvPr/>
+        </p:nvSpPr>
+        <p:spPr>
+          <a:xfrm>
+            <a:off x="5410461" y="3210822"/>
+            <a:ext cx="499267" cy="336125"/>
+          </a:xfrm>
+          <a:prstGeom prst="rect">
+            <a:avLst/>
+          </a:prstGeom>
+          <a:solidFill>
+            <a:schemeClr val="bg1">
+              <a:alpha val="73000"/>
+            </a:schemeClr>
+          </a:solidFill>
+        </p:spPr>
+        <p:style>
+          <a:lnRef idx="2">
+            <a:schemeClr val="accent1">
+              <a:shade val="50000"/>
+            </a:schemeClr>
+          </a:lnRef>
+          <a:fillRef idx="1">
+            <a:schemeClr val="accent1"/>
+          </a:fillRef>
+          <a:effectRef idx="0">
+            <a:schemeClr val="accent1"/>
+          </a:effectRef>
+          <a:fontRef idx="minor">
+            <a:schemeClr val="lt1"/>
+          </a:fontRef>
+        </p:style>
+        <p:txBody>
+          <a:bodyPr rtlCol="0" anchor="ctr"/>
+          <a:lstStyle/>
+          <a:p>
+            <a:pPr algn="ctr"/>
+            <a:r>
+              <a:rPr lang="en-US" sz="1200" dirty="0" smtClean="0">
+                <a:solidFill>
+                  <a:schemeClr val="accent1">
+                    <a:lumMod val="50000"/>
+                  </a:schemeClr>
+                </a:solidFill>
+              </a:rPr>
+              <a:t>3</a:t>
+            </a:r>
+            <a:endParaRPr lang="en-US" sz="1200" dirty="0">
+              <a:solidFill>
+                <a:schemeClr val="accent1">
+                  <a:lumMod val="50000"/>
+                </a:schemeClr>
+              </a:solidFill>
+            </a:endParaRPr>
+          </a:p>
+        </p:txBody>
+      </p:sp>
+      <p:sp>
+        <p:nvSpPr>
+          <p:cNvPr id="47" name="Rectangle 46"/>
+          <p:cNvSpPr/>
+          <p:nvPr/>
+        </p:nvSpPr>
+        <p:spPr>
+          <a:xfrm>
+            <a:off x="5191464" y="5302672"/>
+            <a:ext cx="499267" cy="336125"/>
+          </a:xfrm>
+          <a:prstGeom prst="rect">
+            <a:avLst/>
+          </a:prstGeom>
+          <a:solidFill>
+            <a:schemeClr val="bg1">
+              <a:alpha val="73000"/>
+            </a:schemeClr>
+          </a:solidFill>
+        </p:spPr>
+        <p:style>
+          <a:lnRef idx="2">
+            <a:schemeClr val="accent1">
+              <a:shade val="50000"/>
+            </a:schemeClr>
+          </a:lnRef>
+          <a:fillRef idx="1">
+            <a:schemeClr val="accent1"/>
+          </a:fillRef>
+          <a:effectRef idx="0">
+            <a:schemeClr val="accent1"/>
+          </a:effectRef>
+          <a:fontRef idx="minor">
+            <a:schemeClr val="lt1"/>
+          </a:fontRef>
+        </p:style>
+        <p:txBody>
+          <a:bodyPr rtlCol="0" anchor="ctr"/>
+          <a:lstStyle/>
+          <a:p>
+            <a:pPr algn="ctr"/>
+            <a:r>
+              <a:rPr lang="en-US" sz="1200" dirty="0" smtClean="0">
+                <a:solidFill>
+                  <a:schemeClr val="accent1">
+                    <a:lumMod val="50000"/>
+                  </a:schemeClr>
+                </a:solidFill>
+              </a:rPr>
+              <a:t>4</a:t>
+            </a:r>
+            <a:endParaRPr lang="en-US" sz="1200" dirty="0">
+              <a:solidFill>
+                <a:schemeClr val="accent1">
+                  <a:lumMod val="50000"/>
+                </a:schemeClr>
+              </a:solidFill>
+            </a:endParaRPr>
+          </a:p>
+        </p:txBody>
+      </p:sp>
+      <p:sp>
+        <p:nvSpPr>
+          <p:cNvPr id="48" name="Rectangle 47"/>
+          <p:cNvSpPr/>
+          <p:nvPr/>
+        </p:nvSpPr>
+        <p:spPr>
+          <a:xfrm>
+            <a:off x="5495064" y="6269175"/>
+            <a:ext cx="499267" cy="336125"/>
+          </a:xfrm>
+          <a:prstGeom prst="rect">
+            <a:avLst/>
+          </a:prstGeom>
+          <a:solidFill>
+            <a:schemeClr val="bg1">
+              <a:alpha val="73000"/>
+            </a:schemeClr>
+          </a:solidFill>
+        </p:spPr>
+        <p:style>
+          <a:lnRef idx="2">
+            <a:schemeClr val="accent1">
+              <a:shade val="50000"/>
+            </a:schemeClr>
+          </a:lnRef>
+          <a:fillRef idx="1">
+            <a:schemeClr val="accent1"/>
+          </a:fillRef>
+          <a:effectRef idx="0">
+            <a:schemeClr val="accent1"/>
+          </a:effectRef>
+          <a:fontRef idx="minor">
+            <a:schemeClr val="lt1"/>
+          </a:fontRef>
+        </p:style>
+        <p:txBody>
+          <a:bodyPr rtlCol="0" anchor="ctr"/>
+          <a:lstStyle/>
+          <a:p>
+            <a:pPr algn="ctr"/>
+            <a:r>
+              <a:rPr lang="en-US" sz="1200" dirty="0" smtClean="0">
+                <a:solidFill>
+                  <a:schemeClr val="accent1">
+                    <a:lumMod val="50000"/>
+                  </a:schemeClr>
+                </a:solidFill>
+              </a:rPr>
+              <a:t>5</a:t>
+            </a:r>
+            <a:endParaRPr lang="en-US" sz="1200" dirty="0">
+              <a:solidFill>
+                <a:schemeClr val="accent1">
+                  <a:lumMod val="50000"/>
+                </a:schemeClr>
+              </a:solidFill>
+            </a:endParaRPr>
+          </a:p>
+        </p:txBody>
+      </p:sp>
+      <p:sp>
+        <p:nvSpPr>
+          <p:cNvPr id="49" name="Rectangle 48"/>
+          <p:cNvSpPr/>
+          <p:nvPr/>
+        </p:nvSpPr>
+        <p:spPr>
+          <a:xfrm>
+            <a:off x="6062678" y="4008314"/>
+            <a:ext cx="499267" cy="336125"/>
+          </a:xfrm>
+          <a:prstGeom prst="rect">
+            <a:avLst/>
+          </a:prstGeom>
+          <a:solidFill>
+            <a:schemeClr val="bg1">
+              <a:alpha val="73000"/>
+            </a:schemeClr>
+          </a:solidFill>
+        </p:spPr>
+        <p:style>
+          <a:lnRef idx="2">
+            <a:schemeClr val="accent1">
+              <a:shade val="50000"/>
+            </a:schemeClr>
+          </a:lnRef>
+          <a:fillRef idx="1">
+            <a:schemeClr val="accent1"/>
+          </a:fillRef>
+          <a:effectRef idx="0">
+            <a:schemeClr val="accent1"/>
+          </a:effectRef>
+          <a:fontRef idx="minor">
+            <a:schemeClr val="lt1"/>
+          </a:fontRef>
+        </p:style>
+        <p:txBody>
+          <a:bodyPr rtlCol="0" anchor="ctr"/>
+          <a:lstStyle/>
+          <a:p>
+            <a:pPr algn="ctr"/>
+            <a:r>
+              <a:rPr lang="en-US" sz="1200" dirty="0" smtClean="0">
+                <a:solidFill>
+                  <a:schemeClr val="accent1">
+                    <a:lumMod val="50000"/>
+                  </a:schemeClr>
+                </a:solidFill>
+              </a:rPr>
+              <a:t>6</a:t>
+            </a:r>
+            <a:endParaRPr lang="en-US" sz="1200" dirty="0">
+              <a:solidFill>
+                <a:schemeClr val="accent1">
+                  <a:lumMod val="50000"/>
+                </a:schemeClr>
+              </a:solidFill>
+            </a:endParaRPr>
+          </a:p>
+        </p:txBody>
+      </p:sp>
+      <p:sp>
+        <p:nvSpPr>
+          <p:cNvPr id="50" name="Rectangle 49"/>
+          <p:cNvSpPr/>
+          <p:nvPr/>
+        </p:nvSpPr>
+        <p:spPr>
+          <a:xfrm>
+            <a:off x="7104659" y="4498962"/>
+            <a:ext cx="499267" cy="336125"/>
+          </a:xfrm>
+          <a:prstGeom prst="rect">
+            <a:avLst/>
+          </a:prstGeom>
+          <a:solidFill>
+            <a:schemeClr val="bg1">
+              <a:alpha val="73000"/>
+            </a:schemeClr>
+          </a:solidFill>
+        </p:spPr>
+        <p:style>
+          <a:lnRef idx="2">
+            <a:schemeClr val="accent1">
+              <a:shade val="50000"/>
+            </a:schemeClr>
+          </a:lnRef>
+          <a:fillRef idx="1">
+            <a:schemeClr val="accent1"/>
+          </a:fillRef>
+          <a:effectRef idx="0">
+            <a:schemeClr val="accent1"/>
+          </a:effectRef>
+          <a:fontRef idx="minor">
+            <a:schemeClr val="lt1"/>
+          </a:fontRef>
+        </p:style>
+        <p:txBody>
+          <a:bodyPr rtlCol="0" anchor="ctr"/>
+          <a:lstStyle/>
+          <a:p>
+            <a:pPr algn="ctr"/>
+            <a:r>
+              <a:rPr lang="en-US" sz="1200" dirty="0" smtClean="0">
+                <a:solidFill>
+                  <a:schemeClr val="accent1">
+                    <a:lumMod val="50000"/>
+                  </a:schemeClr>
+                </a:solidFill>
+              </a:rPr>
+              <a:t>7</a:t>
+            </a:r>
+            <a:endParaRPr lang="en-US" sz="1200" dirty="0">
+              <a:solidFill>
+                <a:schemeClr val="accent1">
+                  <a:lumMod val="50000"/>
+                </a:schemeClr>
+              </a:solidFill>
+            </a:endParaRPr>
+          </a:p>
+        </p:txBody>
+      </p:sp>
+      <p:sp>
+        <p:nvSpPr>
+          <p:cNvPr id="51" name="Rectangle 50"/>
+          <p:cNvSpPr/>
+          <p:nvPr/>
+        </p:nvSpPr>
+        <p:spPr>
+          <a:xfrm>
+            <a:off x="2686205" y="4487446"/>
+            <a:ext cx="499267" cy="336125"/>
+          </a:xfrm>
+          <a:prstGeom prst="rect">
+            <a:avLst/>
+          </a:prstGeom>
+          <a:solidFill>
+            <a:schemeClr val="bg1">
+              <a:alpha val="73000"/>
+            </a:schemeClr>
+          </a:solidFill>
+        </p:spPr>
+        <p:style>
+          <a:lnRef idx="2">
+            <a:schemeClr val="accent1">
+              <a:shade val="50000"/>
+            </a:schemeClr>
+          </a:lnRef>
+          <a:fillRef idx="1">
+            <a:schemeClr val="accent1"/>
+          </a:fillRef>
+          <a:effectRef idx="0">
+            <a:schemeClr val="accent1"/>
+          </a:effectRef>
+          <a:fontRef idx="minor">
+            <a:schemeClr val="lt1"/>
+          </a:fontRef>
+        </p:style>
+        <p:txBody>
+          <a:bodyPr rtlCol="0" anchor="ctr"/>
+          <a:lstStyle/>
+          <a:p>
+            <a:pPr algn="ctr"/>
+            <a:r>
+              <a:rPr lang="en-US" sz="1200" dirty="0" smtClean="0">
+                <a:solidFill>
+                  <a:schemeClr val="accent1">
+                    <a:lumMod val="50000"/>
+                  </a:schemeClr>
+                </a:solidFill>
+              </a:rPr>
+              <a:t>8</a:t>
+            </a:r>
+            <a:endParaRPr lang="en-US" sz="1200" dirty="0">
+              <a:solidFill>
+                <a:schemeClr val="accent1">
+                  <a:lumMod val="50000"/>
+                </a:schemeClr>
+              </a:solidFill>
+            </a:endParaRPr>
+          </a:p>
+        </p:txBody>
+      </p:sp>
+      <p:sp>
+        <p:nvSpPr>
+          <p:cNvPr id="52" name="Rectangle 51"/>
+          <p:cNvSpPr/>
+          <p:nvPr/>
+        </p:nvSpPr>
+        <p:spPr>
+          <a:xfrm>
+            <a:off x="3702016" y="4308935"/>
+            <a:ext cx="499267" cy="336125"/>
+          </a:xfrm>
+          <a:prstGeom prst="rect">
+            <a:avLst/>
+          </a:prstGeom>
+          <a:solidFill>
+            <a:schemeClr val="bg1">
+              <a:alpha val="73000"/>
+            </a:schemeClr>
+          </a:solidFill>
+        </p:spPr>
+        <p:style>
+          <a:lnRef idx="2">
+            <a:schemeClr val="accent1">
+              <a:shade val="50000"/>
+            </a:schemeClr>
+          </a:lnRef>
+          <a:fillRef idx="1">
+            <a:schemeClr val="accent1"/>
+          </a:fillRef>
+          <a:effectRef idx="0">
+            <a:schemeClr val="accent1"/>
+          </a:effectRef>
+          <a:fontRef idx="minor">
+            <a:schemeClr val="lt1"/>
+          </a:fontRef>
+        </p:style>
+        <p:txBody>
+          <a:bodyPr rtlCol="0" anchor="ctr"/>
+          <a:lstStyle/>
+          <a:p>
+            <a:pPr algn="ctr"/>
+            <a:r>
+              <a:rPr lang="en-US" sz="1200" dirty="0" smtClean="0">
+                <a:solidFill>
+                  <a:schemeClr val="accent1">
+                    <a:lumMod val="50000"/>
+                  </a:schemeClr>
+                </a:solidFill>
+              </a:rPr>
+              <a:t>9</a:t>
+            </a:r>
+            <a:endParaRPr lang="en-US" sz="1200" dirty="0">
+              <a:solidFill>
+                <a:schemeClr val="accent1">
+                  <a:lumMod val="50000"/>
+                </a:schemeClr>
+              </a:solidFill>
+            </a:endParaRPr>
+          </a:p>
+        </p:txBody>
+      </p:sp>
+      <p:sp>
+        <p:nvSpPr>
+          <p:cNvPr id="53" name="Rectangle 52"/>
+          <p:cNvSpPr/>
+          <p:nvPr/>
+        </p:nvSpPr>
+        <p:spPr>
+          <a:xfrm>
+            <a:off x="1449156" y="4981185"/>
+            <a:ext cx="499267" cy="336125"/>
+          </a:xfrm>
+          <a:prstGeom prst="rect">
+            <a:avLst/>
+          </a:prstGeom>
+          <a:solidFill>
+            <a:schemeClr val="bg1">
+              <a:alpha val="73000"/>
+            </a:schemeClr>
+          </a:solidFill>
+        </p:spPr>
+        <p:style>
+          <a:lnRef idx="2">
+            <a:schemeClr val="accent1">
+              <a:shade val="50000"/>
+            </a:schemeClr>
+          </a:lnRef>
+          <a:fillRef idx="1">
+            <a:schemeClr val="accent1"/>
+          </a:fillRef>
+          <a:effectRef idx="0">
+            <a:schemeClr val="accent1"/>
+          </a:effectRef>
+          <a:fontRef idx="minor">
+            <a:schemeClr val="lt1"/>
+          </a:fontRef>
+        </p:style>
+        <p:txBody>
+          <a:bodyPr rtlCol="0" anchor="ctr"/>
+          <a:lstStyle/>
+          <a:p>
+            <a:pPr algn="ctr"/>
+            <a:r>
+              <a:rPr lang="en-US" sz="1200" dirty="0" smtClean="0">
+                <a:solidFill>
+                  <a:schemeClr val="accent1">
+                    <a:lumMod val="50000"/>
+                  </a:schemeClr>
+                </a:solidFill>
+              </a:rPr>
+              <a:t>10</a:t>
+            </a:r>
+            <a:endParaRPr lang="en-US" sz="1200" dirty="0">
+              <a:solidFill>
+                <a:schemeClr val="accent1">
+                  <a:lumMod val="50000"/>
+                </a:schemeClr>
+              </a:solidFill>
+            </a:endParaRPr>
+          </a:p>
+        </p:txBody>
+      </p:sp>
+      <p:cxnSp>
+        <p:nvCxnSpPr>
+          <p:cNvPr id="54" name="Curved Connector 53"/>
+          <p:cNvCxnSpPr>
+            <a:stCxn id="8" idx="0"/>
+            <a:endCxn id="7" idx="0"/>
+          </p:cNvCxnSpPr>
+          <p:nvPr/>
+        </p:nvCxnSpPr>
+        <p:spPr>
+          <a:xfrm rot="5400000" flipH="1" flipV="1">
+            <a:off x="5117509" y="676403"/>
+            <a:ext cx="12700" cy="5260932"/>
+          </a:xfrm>
+          <a:prstGeom prst="curvedConnector3">
+            <a:avLst>
+              <a:gd name="adj1" fmla="val 2293150"/>
+            </a:avLst>
+          </a:prstGeom>
+          <a:ln>
+            <a:solidFill>
+              <a:srgbClr val="C00000"/>
+            </a:solidFill>
+            <a:tailEnd type="triangle"/>
+          </a:ln>
+        </p:spPr>
+        <p:style>
+          <a:lnRef idx="1">
+            <a:schemeClr val="accent1"/>
+          </a:lnRef>
+          <a:fillRef idx="0">
+            <a:schemeClr val="accent1"/>
+          </a:fillRef>
+          <a:effectRef idx="0">
+            <a:schemeClr val="accent1"/>
+          </a:effectRef>
+          <a:fontRef idx="minor">
+            <a:schemeClr val="tx1"/>
+          </a:fontRef>
+        </p:style>
+      </p:cxnSp>
+      <p:sp>
+        <p:nvSpPr>
+          <p:cNvPr id="58" name="Rectangle 57"/>
+          <p:cNvSpPr/>
+          <p:nvPr/>
+        </p:nvSpPr>
+        <p:spPr>
+          <a:xfrm>
+            <a:off x="3313395" y="2915334"/>
+            <a:ext cx="499267" cy="336125"/>
+          </a:xfrm>
+          <a:prstGeom prst="rect">
+            <a:avLst/>
+          </a:prstGeom>
+          <a:solidFill>
+            <a:schemeClr val="bg1">
+              <a:alpha val="73000"/>
+            </a:schemeClr>
+          </a:solidFill>
+        </p:spPr>
+        <p:style>
+          <a:lnRef idx="2">
+            <a:schemeClr val="accent1">
+              <a:shade val="50000"/>
+            </a:schemeClr>
+          </a:lnRef>
+          <a:fillRef idx="1">
+            <a:schemeClr val="accent1"/>
+          </a:fillRef>
+          <a:effectRef idx="0">
+            <a:schemeClr val="accent1"/>
+          </a:effectRef>
+          <a:fontRef idx="minor">
+            <a:schemeClr val="lt1"/>
+          </a:fontRef>
+        </p:style>
+        <p:txBody>
+          <a:bodyPr rtlCol="0" anchor="ctr"/>
+          <a:lstStyle/>
+          <a:p>
+            <a:pPr algn="ctr"/>
+            <a:r>
+              <a:rPr lang="en-US" sz="1200" dirty="0" smtClean="0">
+                <a:solidFill>
+                  <a:schemeClr val="accent1">
+                    <a:lumMod val="50000"/>
+                  </a:schemeClr>
+                </a:solidFill>
+              </a:rPr>
+              <a:t>11</a:t>
+            </a:r>
+            <a:endParaRPr lang="en-US" sz="1200" dirty="0">
+              <a:solidFill>
+                <a:schemeClr val="accent1">
+                  <a:lumMod val="50000"/>
+                </a:schemeClr>
+              </a:solidFill>
+            </a:endParaRPr>
+          </a:p>
+        </p:txBody>
+      </p:sp>
     </p:spTree>
     <p:extLst>
       <p:ext uri="{BB962C8B-B14F-4D97-AF65-F5344CB8AC3E}">
         <p14:creationId xmlns:p14="http://schemas.microsoft.com/office/powerpoint/2010/main" val="864301980"/>
+      </p:ext>
+    </p:extLst>
+  </p:cSld>
+  <p:clrMapOvr>
+    <a:masterClrMapping/>
+  </p:clrMapOvr>
+  <p:timing>
+    <p:tnLst>
+      <p:par>
+        <p:cTn id="1" dur="indefinite" restart="never" nodeType="tmRoot"/>
+      </p:par>
+    </p:tnLst>
+  </p:timing>
+</p:sld>
+</file>
+
+<file path=ppt/slides/slide13.xml><?xml version="1.0" encoding="utf-8"?>
+<p:sld xmlns:a="http://schemas.openxmlformats.org/drawingml/2006/main" xmlns:r="http://schemas.openxmlformats.org/officeDocument/2006/relationships" xmlns:p="http://schemas.openxmlformats.org/presentationml/2006/main">
+  <p:cSld>
+    <p:spTree>
+      <p:nvGrpSpPr>
+        <p:cNvPr id="1" name=""/>
+        <p:cNvGrpSpPr/>
+        <p:nvPr/>
+      </p:nvGrpSpPr>
+      <p:grpSpPr>
+        <a:xfrm>
+          <a:off x="0" y="0"/>
+          <a:ext cx="0" cy="0"/>
+          <a:chOff x="0" y="0"/>
+          <a:chExt cx="0" cy="0"/>
+        </a:xfrm>
+      </p:grpSpPr>
+      <p:sp>
+        <p:nvSpPr>
+          <p:cNvPr id="2" name="Title 1"/>
+          <p:cNvSpPr>
+            <a:spLocks noGrp="1"/>
+          </p:cNvSpPr>
+          <p:nvPr>
+            <p:ph type="title"/>
+          </p:nvPr>
+        </p:nvSpPr>
+        <p:spPr>
+          <a:xfrm>
+            <a:off x="677334" y="609600"/>
+            <a:ext cx="8596668" cy="931101"/>
+          </a:xfrm>
+        </p:spPr>
+        <p:txBody>
+          <a:bodyPr/>
+          <a:lstStyle/>
+          <a:p>
+            <a:r>
+              <a:rPr lang="en-US" dirty="0" smtClean="0"/>
+              <a:t>Activity State </a:t>
+            </a:r>
+            <a:r>
+              <a:rPr lang="en-US" dirty="0" smtClean="0"/>
+              <a:t>Transitional Diagram</a:t>
+            </a:r>
+            <a:endParaRPr lang="en-US" dirty="0"/>
+          </a:p>
+        </p:txBody>
+      </p:sp>
+      <p:graphicFrame>
+        <p:nvGraphicFramePr>
+          <p:cNvPr id="19" name="Table 18"/>
+          <p:cNvGraphicFramePr>
+            <a:graphicFrameLocks noGrp="1"/>
+          </p:cNvGraphicFramePr>
+          <p:nvPr>
+            <p:extLst>
+              <p:ext uri="{D42A27DB-BD31-4B8C-83A1-F6EECF244321}">
+                <p14:modId xmlns:p14="http://schemas.microsoft.com/office/powerpoint/2010/main" val="1678763846"/>
+              </p:ext>
+            </p:extLst>
+          </p:nvPr>
+        </p:nvGraphicFramePr>
+        <p:xfrm>
+          <a:off x="1146001" y="1523430"/>
+          <a:ext cx="7709900" cy="4622800"/>
+        </p:xfrm>
+        <a:graphic>
+          <a:graphicData uri="http://schemas.openxmlformats.org/drawingml/2006/table">
+            <a:tbl>
+              <a:tblPr firstRow="1" bandRow="1">
+                <a:tableStyleId>{5C22544A-7EE6-4342-B048-85BDC9FD1C3A}</a:tableStyleId>
+              </a:tblPr>
+              <a:tblGrid>
+                <a:gridCol w="570066"/>
+                <a:gridCol w="1252601"/>
+                <a:gridCol w="3006247"/>
+                <a:gridCol w="989556"/>
+                <a:gridCol w="1891430"/>
+              </a:tblGrid>
+              <a:tr h="370840">
+                <a:tc>
+                  <a:txBody>
+                    <a:bodyPr/>
+                    <a:lstStyle/>
+                    <a:p>
+                      <a:pPr algn="ctr"/>
+                      <a:r>
+                        <a:rPr lang="en-US" sz="1200" dirty="0" smtClean="0"/>
+                        <a:t>No.</a:t>
+                      </a:r>
+                      <a:endParaRPr lang="en-US" sz="1200" dirty="0"/>
+                    </a:p>
+                  </a:txBody>
+                  <a:tcPr anchor="ctr"/>
+                </a:tc>
+                <a:tc>
+                  <a:txBody>
+                    <a:bodyPr/>
+                    <a:lstStyle/>
+                    <a:p>
+                      <a:pPr algn="ctr"/>
+                      <a:r>
+                        <a:rPr lang="en-US" sz="1200" dirty="0" smtClean="0"/>
+                        <a:t>Previous State</a:t>
+                      </a:r>
+                      <a:endParaRPr lang="en-US" sz="1200" dirty="0"/>
+                    </a:p>
+                  </a:txBody>
+                  <a:tcPr anchor="ctr"/>
+                </a:tc>
+                <a:tc>
+                  <a:txBody>
+                    <a:bodyPr/>
+                    <a:lstStyle/>
+                    <a:p>
+                      <a:pPr algn="ctr"/>
+                      <a:r>
+                        <a:rPr lang="en-US" sz="1200" dirty="0" smtClean="0"/>
+                        <a:t>Trigger</a:t>
+                      </a:r>
+                      <a:endParaRPr lang="en-US" sz="1200" dirty="0"/>
+                    </a:p>
+                  </a:txBody>
+                  <a:tcPr anchor="ctr"/>
+                </a:tc>
+                <a:tc>
+                  <a:txBody>
+                    <a:bodyPr/>
+                    <a:lstStyle/>
+                    <a:p>
+                      <a:pPr marL="0" marR="0" indent="0" algn="ctr" defTabSz="457200" rtl="0" eaLnBrk="1" fontAlgn="auto" latinLnBrk="0" hangingPunct="1">
+                        <a:lnSpc>
+                          <a:spcPct val="100000"/>
+                        </a:lnSpc>
+                        <a:spcBef>
+                          <a:spcPts val="0"/>
+                        </a:spcBef>
+                        <a:spcAft>
+                          <a:spcPts val="0"/>
+                        </a:spcAft>
+                        <a:buClrTx/>
+                        <a:buSzTx/>
+                        <a:buFontTx/>
+                        <a:buNone/>
+                        <a:tabLst/>
+                        <a:defRPr/>
+                      </a:pPr>
+                      <a:r>
+                        <a:rPr lang="en-US" sz="1200" dirty="0" smtClean="0"/>
+                        <a:t>Next State</a:t>
+                      </a:r>
+                    </a:p>
+                  </a:txBody>
+                  <a:tcPr anchor="ctr"/>
+                </a:tc>
+                <a:tc>
+                  <a:txBody>
+                    <a:bodyPr/>
+                    <a:lstStyle/>
+                    <a:p>
+                      <a:pPr algn="ctr"/>
+                      <a:r>
+                        <a:rPr lang="en-US" sz="1200" dirty="0" smtClean="0"/>
+                        <a:t>Remarks</a:t>
+                      </a:r>
+                      <a:endParaRPr lang="en-US" sz="1200" dirty="0"/>
+                    </a:p>
+                  </a:txBody>
+                  <a:tcPr anchor="ctr"/>
+                </a:tc>
+              </a:tr>
+              <a:tr h="370840">
+                <a:tc>
+                  <a:txBody>
+                    <a:bodyPr/>
+                    <a:lstStyle/>
+                    <a:p>
+                      <a:pPr algn="l"/>
+                      <a:r>
+                        <a:rPr lang="en-US" sz="1200" b="1" dirty="0" smtClean="0"/>
+                        <a:t>1.</a:t>
+                      </a:r>
+                      <a:endParaRPr lang="en-US" sz="1200" b="1" dirty="0"/>
+                    </a:p>
+                  </a:txBody>
+                  <a:tcPr anchor="ctr"/>
+                </a:tc>
+                <a:tc>
+                  <a:txBody>
+                    <a:bodyPr/>
+                    <a:lstStyle/>
+                    <a:p>
+                      <a:r>
+                        <a:rPr lang="en-US" sz="1200" dirty="0" smtClean="0"/>
+                        <a:t>Not Started</a:t>
+                      </a:r>
+                      <a:endParaRPr lang="en-US" sz="1200" dirty="0"/>
+                    </a:p>
+                  </a:txBody>
+                  <a:tcPr anchor="ctr"/>
+                </a:tc>
+                <a:tc>
+                  <a:txBody>
+                    <a:bodyPr/>
+                    <a:lstStyle/>
+                    <a:p>
+                      <a:r>
+                        <a:rPr lang="en-US" sz="1200" dirty="0" smtClean="0"/>
+                        <a:t>User sets </a:t>
+                      </a:r>
+                      <a:r>
+                        <a:rPr lang="en-US" sz="1200" dirty="0" err="1" smtClean="0"/>
+                        <a:t>ddayDateTime</a:t>
+                      </a:r>
+                      <a:endParaRPr lang="en-US" sz="1200" dirty="0"/>
+                    </a:p>
+                  </a:txBody>
+                  <a:tcPr anchor="ctr"/>
+                </a:tc>
+                <a:tc>
+                  <a:txBody>
+                    <a:bodyPr/>
+                    <a:lstStyle/>
+                    <a:p>
+                      <a:r>
+                        <a:rPr lang="en-US" sz="1200" dirty="0" smtClean="0"/>
+                        <a:t>Scheduled</a:t>
+                      </a:r>
+                      <a:endParaRPr lang="en-US" sz="1200" dirty="0"/>
+                    </a:p>
+                  </a:txBody>
+                  <a:tcPr anchor="ctr"/>
+                </a:tc>
+                <a:tc>
+                  <a:txBody>
+                    <a:bodyPr/>
+                    <a:lstStyle/>
+                    <a:p>
+                      <a:pPr algn="l"/>
+                      <a:endParaRPr lang="en-US" sz="1200" b="1" dirty="0"/>
+                    </a:p>
+                  </a:txBody>
+                  <a:tcPr anchor="ctr"/>
+                </a:tc>
+              </a:tr>
+              <a:tr h="370840">
+                <a:tc>
+                  <a:txBody>
+                    <a:bodyPr/>
+                    <a:lstStyle/>
+                    <a:p>
+                      <a:pPr algn="l"/>
+                      <a:r>
+                        <a:rPr lang="en-US" sz="1200" b="1" dirty="0" smtClean="0"/>
+                        <a:t>2.</a:t>
+                      </a:r>
+                      <a:endParaRPr lang="en-US" sz="1200" b="1" dirty="0"/>
+                    </a:p>
+                  </a:txBody>
+                  <a:tcPr anchor="ctr"/>
+                </a:tc>
+                <a:tc>
+                  <a:txBody>
+                    <a:bodyPr/>
+                    <a:lstStyle/>
+                    <a:p>
+                      <a:r>
+                        <a:rPr lang="en-US" sz="1200" dirty="0" smtClean="0"/>
+                        <a:t>Scheduled</a:t>
+                      </a:r>
+                      <a:endParaRPr lang="en-US" sz="1200" dirty="0"/>
+                    </a:p>
+                  </a:txBody>
+                  <a:tcPr anchor="ctr"/>
+                </a:tc>
+                <a:tc>
+                  <a:txBody>
+                    <a:bodyPr/>
+                    <a:lstStyle/>
+                    <a:p>
+                      <a:r>
+                        <a:rPr lang="en-US" sz="1200" dirty="0" smtClean="0"/>
+                        <a:t>Current</a:t>
+                      </a:r>
+                      <a:r>
+                        <a:rPr lang="en-US" sz="1200" baseline="0" dirty="0" smtClean="0"/>
+                        <a:t> date = </a:t>
+                      </a:r>
+                      <a:r>
+                        <a:rPr lang="en-US" sz="1200" baseline="0" dirty="0" err="1" smtClean="0"/>
+                        <a:t>ddayDate</a:t>
+                      </a:r>
+                      <a:endParaRPr lang="en-US" sz="1200" dirty="0"/>
+                    </a:p>
+                  </a:txBody>
+                  <a:tcPr anchor="ctr"/>
+                </a:tc>
+                <a:tc>
+                  <a:txBody>
+                    <a:bodyPr/>
+                    <a:lstStyle/>
+                    <a:p>
+                      <a:r>
+                        <a:rPr lang="en-US" sz="1200" dirty="0" smtClean="0"/>
+                        <a:t>D-Day</a:t>
+                      </a:r>
+                      <a:endParaRPr lang="en-US" sz="1200" dirty="0"/>
+                    </a:p>
+                  </a:txBody>
+                  <a:tcPr anchor="ctr"/>
+                </a:tc>
+                <a:tc>
+                  <a:txBody>
+                    <a:bodyPr/>
+                    <a:lstStyle/>
+                    <a:p>
+                      <a:pPr algn="l"/>
+                      <a:endParaRPr lang="en-US" sz="1200" b="1" dirty="0"/>
+                    </a:p>
+                  </a:txBody>
+                  <a:tcPr anchor="ctr"/>
+                </a:tc>
+              </a:tr>
+              <a:tr h="370840">
+                <a:tc>
+                  <a:txBody>
+                    <a:bodyPr/>
+                    <a:lstStyle/>
+                    <a:p>
+                      <a:pPr algn="l"/>
+                      <a:r>
+                        <a:rPr lang="en-US" sz="1200" b="1" dirty="0" smtClean="0"/>
+                        <a:t>3.</a:t>
+                      </a:r>
+                      <a:endParaRPr lang="en-US" sz="1200" b="1" dirty="0"/>
+                    </a:p>
+                  </a:txBody>
+                  <a:tcPr anchor="ctr"/>
+                </a:tc>
+                <a:tc>
+                  <a:txBody>
+                    <a:bodyPr/>
+                    <a:lstStyle/>
+                    <a:p>
+                      <a:r>
+                        <a:rPr lang="en-US" sz="1200" dirty="0" smtClean="0"/>
+                        <a:t>Scheduled</a:t>
+                      </a:r>
+                      <a:endParaRPr lang="en-US" sz="1200" dirty="0"/>
+                    </a:p>
+                  </a:txBody>
+                  <a:tcPr anchor="ctr"/>
+                </a:tc>
+                <a:tc>
+                  <a:txBody>
+                    <a:bodyPr/>
+                    <a:lstStyle/>
+                    <a:p>
+                      <a:r>
+                        <a:rPr lang="en-US" sz="1200" dirty="0" smtClean="0"/>
+                        <a:t>User resets</a:t>
+                      </a:r>
+                      <a:r>
+                        <a:rPr lang="en-US" sz="1200" baseline="0" dirty="0" smtClean="0"/>
+                        <a:t> </a:t>
+                      </a:r>
+                      <a:r>
+                        <a:rPr lang="en-US" sz="1200" baseline="0" dirty="0" err="1" smtClean="0"/>
+                        <a:t>ddayDateTime</a:t>
+                      </a:r>
+                      <a:endParaRPr lang="en-US" sz="1200" dirty="0"/>
+                    </a:p>
+                  </a:txBody>
+                  <a:tcPr anchor="ctr"/>
+                </a:tc>
+                <a:tc>
+                  <a:txBody>
+                    <a:bodyPr/>
+                    <a:lstStyle/>
+                    <a:p>
+                      <a:pPr marL="0" marR="0" indent="0" algn="l" defTabSz="457200" rtl="0" eaLnBrk="1" fontAlgn="auto" latinLnBrk="0" hangingPunct="1">
+                        <a:lnSpc>
+                          <a:spcPct val="100000"/>
+                        </a:lnSpc>
+                        <a:spcBef>
+                          <a:spcPts val="0"/>
+                        </a:spcBef>
+                        <a:spcAft>
+                          <a:spcPts val="0"/>
+                        </a:spcAft>
+                        <a:buClrTx/>
+                        <a:buSzTx/>
+                        <a:buFontTx/>
+                        <a:buNone/>
+                        <a:tabLst/>
+                        <a:defRPr/>
+                      </a:pPr>
+                      <a:r>
+                        <a:rPr lang="en-US" sz="1200" dirty="0" smtClean="0"/>
+                        <a:t>Not Started</a:t>
+                      </a:r>
+                    </a:p>
+                  </a:txBody>
+                  <a:tcPr anchor="ctr"/>
+                </a:tc>
+                <a:tc>
+                  <a:txBody>
+                    <a:bodyPr/>
+                    <a:lstStyle/>
+                    <a:p>
+                      <a:pPr algn="l"/>
+                      <a:endParaRPr lang="en-US" sz="1200" b="1" dirty="0"/>
+                    </a:p>
+                  </a:txBody>
+                  <a:tcPr anchor="ctr"/>
+                </a:tc>
+              </a:tr>
+              <a:tr h="370840">
+                <a:tc>
+                  <a:txBody>
+                    <a:bodyPr/>
+                    <a:lstStyle/>
+                    <a:p>
+                      <a:pPr algn="l"/>
+                      <a:r>
+                        <a:rPr lang="en-US" sz="1200" dirty="0" smtClean="0"/>
+                        <a:t>4.</a:t>
+                      </a:r>
+                      <a:endParaRPr lang="en-US" sz="1200" dirty="0"/>
+                    </a:p>
+                  </a:txBody>
+                  <a:tcPr anchor="ctr"/>
+                </a:tc>
+                <a:tc>
+                  <a:txBody>
+                    <a:bodyPr/>
+                    <a:lstStyle/>
+                    <a:p>
+                      <a:r>
+                        <a:rPr lang="en-US" sz="1200" dirty="0" smtClean="0"/>
+                        <a:t>D-Day</a:t>
+                      </a:r>
+                      <a:endParaRPr lang="en-US" sz="1200" dirty="0"/>
+                    </a:p>
+                  </a:txBody>
+                  <a:tcPr anchor="ctr"/>
+                </a:tc>
+                <a:tc>
+                  <a:txBody>
+                    <a:bodyPr/>
+                    <a:lstStyle/>
+                    <a:p>
+                      <a:r>
+                        <a:rPr lang="en-US" sz="1200" dirty="0" smtClean="0"/>
+                        <a:t>User completes the activity</a:t>
+                      </a:r>
+                      <a:endParaRPr lang="en-US" sz="1200" dirty="0"/>
+                    </a:p>
+                  </a:txBody>
+                  <a:tcPr anchor="ctr"/>
+                </a:tc>
+                <a:tc>
+                  <a:txBody>
+                    <a:bodyPr/>
+                    <a:lstStyle/>
+                    <a:p>
+                      <a:r>
+                        <a:rPr lang="en-US" sz="1200" dirty="0" smtClean="0"/>
+                        <a:t>Completed</a:t>
+                      </a:r>
+                      <a:endParaRPr lang="en-US" sz="1200" dirty="0"/>
+                    </a:p>
+                  </a:txBody>
+                  <a:tcPr anchor="ctr"/>
+                </a:tc>
+                <a:tc>
+                  <a:txBody>
+                    <a:bodyPr/>
+                    <a:lstStyle/>
+                    <a:p>
+                      <a:pPr algn="l"/>
+                      <a:endParaRPr lang="en-US" sz="1200" dirty="0"/>
+                    </a:p>
+                  </a:txBody>
+                  <a:tcPr anchor="ctr"/>
+                </a:tc>
+              </a:tr>
+              <a:tr h="370840">
+                <a:tc>
+                  <a:txBody>
+                    <a:bodyPr/>
+                    <a:lstStyle/>
+                    <a:p>
+                      <a:pPr algn="l"/>
+                      <a:r>
+                        <a:rPr lang="en-US" sz="1200" dirty="0" smtClean="0"/>
+                        <a:t>5.</a:t>
+                      </a:r>
+                      <a:endParaRPr lang="en-US" sz="1200" dirty="0"/>
+                    </a:p>
+                  </a:txBody>
+                  <a:tcPr anchor="ctr"/>
+                </a:tc>
+                <a:tc>
+                  <a:txBody>
+                    <a:bodyPr/>
+                    <a:lstStyle/>
+                    <a:p>
+                      <a:r>
+                        <a:rPr lang="en-US" sz="1200" smtClean="0"/>
+                        <a:t>D-Day</a:t>
+                      </a:r>
+                      <a:endParaRPr lang="en-US" sz="1200"/>
+                    </a:p>
+                  </a:txBody>
+                  <a:tcPr anchor="ctr"/>
+                </a:tc>
+                <a:tc>
+                  <a:txBody>
+                    <a:bodyPr/>
+                    <a:lstStyle/>
+                    <a:p>
+                      <a:r>
+                        <a:rPr lang="en-US" sz="1200" dirty="0" smtClean="0"/>
+                        <a:t>Current date &gt; </a:t>
+                      </a:r>
+                      <a:r>
+                        <a:rPr lang="en-US" sz="1200" dirty="0" err="1" smtClean="0"/>
+                        <a:t>ddayDate</a:t>
+                      </a:r>
+                      <a:r>
+                        <a:rPr lang="en-US" sz="1200" dirty="0" smtClean="0"/>
+                        <a:t> and user</a:t>
+                      </a:r>
+                      <a:r>
+                        <a:rPr lang="en-US" sz="1200" baseline="0" dirty="0" smtClean="0"/>
+                        <a:t> has not completed the activity</a:t>
+                      </a:r>
+                      <a:endParaRPr lang="en-US" sz="1200" dirty="0"/>
+                    </a:p>
+                  </a:txBody>
+                  <a:tcPr anchor="ctr"/>
+                </a:tc>
+                <a:tc>
+                  <a:txBody>
+                    <a:bodyPr/>
+                    <a:lstStyle/>
+                    <a:p>
+                      <a:r>
+                        <a:rPr lang="en-US" sz="1200" dirty="0" smtClean="0"/>
+                        <a:t>Due</a:t>
+                      </a:r>
+                      <a:endParaRPr lang="en-US" sz="1200" dirty="0"/>
+                    </a:p>
+                  </a:txBody>
+                  <a:tcPr anchor="ctr"/>
+                </a:tc>
+                <a:tc>
+                  <a:txBody>
+                    <a:bodyPr/>
+                    <a:lstStyle/>
+                    <a:p>
+                      <a:pPr algn="l"/>
+                      <a:endParaRPr lang="en-US" sz="1200" dirty="0"/>
+                    </a:p>
+                  </a:txBody>
+                  <a:tcPr anchor="ctr"/>
+                </a:tc>
+              </a:tr>
+              <a:tr h="370840">
+                <a:tc>
+                  <a:txBody>
+                    <a:bodyPr/>
+                    <a:lstStyle/>
+                    <a:p>
+                      <a:pPr algn="l"/>
+                      <a:r>
+                        <a:rPr lang="en-US" sz="1200" dirty="0" smtClean="0"/>
+                        <a:t>6.</a:t>
+                      </a:r>
+                      <a:endParaRPr lang="en-US" sz="1200" dirty="0"/>
+                    </a:p>
+                  </a:txBody>
+                  <a:tcPr anchor="ctr"/>
+                </a:tc>
+                <a:tc>
+                  <a:txBody>
+                    <a:bodyPr/>
+                    <a:lstStyle/>
+                    <a:p>
+                      <a:r>
+                        <a:rPr lang="en-US" sz="1200" smtClean="0"/>
+                        <a:t>D-Day</a:t>
+                      </a:r>
+                      <a:endParaRPr lang="en-US" sz="1200"/>
+                    </a:p>
+                  </a:txBody>
+                  <a:tcPr anchor="ctr"/>
+                </a:tc>
+                <a:tc>
+                  <a:txBody>
+                    <a:bodyPr/>
+                    <a:lstStyle/>
+                    <a:p>
+                      <a:pPr marL="0" marR="0" indent="0" algn="l" defTabSz="457200" rtl="0" eaLnBrk="1" fontAlgn="auto" latinLnBrk="0" hangingPunct="1">
+                        <a:lnSpc>
+                          <a:spcPct val="100000"/>
+                        </a:lnSpc>
+                        <a:spcBef>
+                          <a:spcPts val="0"/>
+                        </a:spcBef>
+                        <a:spcAft>
+                          <a:spcPts val="0"/>
+                        </a:spcAft>
+                        <a:buClrTx/>
+                        <a:buSzTx/>
+                        <a:buFontTx/>
+                        <a:buNone/>
+                        <a:tabLst/>
+                        <a:defRPr/>
+                      </a:pPr>
+                      <a:r>
+                        <a:rPr lang="en-US" sz="1200" dirty="0" smtClean="0"/>
+                        <a:t>User resets</a:t>
+                      </a:r>
+                      <a:r>
+                        <a:rPr lang="en-US" sz="1200" baseline="0" dirty="0" smtClean="0"/>
+                        <a:t> </a:t>
+                      </a:r>
+                      <a:r>
+                        <a:rPr lang="en-US" sz="1200" baseline="0" dirty="0" err="1" smtClean="0"/>
+                        <a:t>ddayDateTime</a:t>
+                      </a:r>
+                      <a:endParaRPr lang="en-US" sz="1200" dirty="0" smtClean="0"/>
+                    </a:p>
+                  </a:txBody>
+                  <a:tcPr anchor="ctr"/>
+                </a:tc>
+                <a:tc>
+                  <a:txBody>
+                    <a:bodyPr/>
+                    <a:lstStyle/>
+                    <a:p>
+                      <a:pPr marL="0" marR="0" indent="0" algn="l" defTabSz="457200" rtl="0" eaLnBrk="1" fontAlgn="auto" latinLnBrk="0" hangingPunct="1">
+                        <a:lnSpc>
+                          <a:spcPct val="100000"/>
+                        </a:lnSpc>
+                        <a:spcBef>
+                          <a:spcPts val="0"/>
+                        </a:spcBef>
+                        <a:spcAft>
+                          <a:spcPts val="0"/>
+                        </a:spcAft>
+                        <a:buClrTx/>
+                        <a:buSzTx/>
+                        <a:buFontTx/>
+                        <a:buNone/>
+                        <a:tabLst/>
+                        <a:defRPr/>
+                      </a:pPr>
+                      <a:r>
+                        <a:rPr lang="en-US" sz="1200" dirty="0" smtClean="0"/>
+                        <a:t>Not Started</a:t>
+                      </a:r>
+                    </a:p>
+                  </a:txBody>
+                  <a:tcPr anchor="ctr"/>
+                </a:tc>
+                <a:tc>
+                  <a:txBody>
+                    <a:bodyPr/>
+                    <a:lstStyle/>
+                    <a:p>
+                      <a:pPr algn="l"/>
+                      <a:endParaRPr lang="en-US" sz="1200" dirty="0"/>
+                    </a:p>
+                  </a:txBody>
+                  <a:tcPr anchor="ctr"/>
+                </a:tc>
+              </a:tr>
+              <a:tr h="370840">
+                <a:tc>
+                  <a:txBody>
+                    <a:bodyPr/>
+                    <a:lstStyle/>
+                    <a:p>
+                      <a:pPr algn="l"/>
+                      <a:r>
+                        <a:rPr lang="en-US" sz="1200" dirty="0" smtClean="0"/>
+                        <a:t>7.</a:t>
+                      </a:r>
+                      <a:endParaRPr lang="en-US" sz="1200" dirty="0"/>
+                    </a:p>
+                  </a:txBody>
+                  <a:tcPr anchor="ctr"/>
+                </a:tc>
+                <a:tc>
+                  <a:txBody>
+                    <a:bodyPr/>
+                    <a:lstStyle/>
+                    <a:p>
+                      <a:r>
+                        <a:rPr lang="en-US" sz="1200" dirty="0" smtClean="0"/>
+                        <a:t>D-Day</a:t>
+                      </a:r>
+                      <a:endParaRPr lang="en-US" sz="1200" dirty="0"/>
+                    </a:p>
+                  </a:txBody>
+                  <a:tcPr anchor="ctr"/>
+                </a:tc>
+                <a:tc>
+                  <a:txBody>
+                    <a:bodyPr/>
+                    <a:lstStyle/>
+                    <a:p>
+                      <a:pPr marL="0" marR="0" indent="0" algn="l" defTabSz="457200" rtl="0" eaLnBrk="1" fontAlgn="auto" latinLnBrk="0" hangingPunct="1">
+                        <a:lnSpc>
+                          <a:spcPct val="100000"/>
+                        </a:lnSpc>
+                        <a:spcBef>
+                          <a:spcPts val="0"/>
+                        </a:spcBef>
+                        <a:spcAft>
+                          <a:spcPts val="0"/>
+                        </a:spcAft>
+                        <a:buClrTx/>
+                        <a:buSzTx/>
+                        <a:buFontTx/>
+                        <a:buNone/>
+                        <a:tabLst/>
+                        <a:defRPr/>
+                      </a:pPr>
+                      <a:r>
+                        <a:rPr lang="en-US" sz="1200" dirty="0" smtClean="0"/>
+                        <a:t>User changes/delays </a:t>
+                      </a:r>
+                      <a:r>
+                        <a:rPr lang="en-US" sz="1200" baseline="0" dirty="0" err="1" smtClean="0"/>
+                        <a:t>ddayDateTime</a:t>
+                      </a:r>
+                      <a:endParaRPr lang="en-US" sz="1200" dirty="0" smtClean="0"/>
+                    </a:p>
+                  </a:txBody>
+                  <a:tcPr anchor="ctr"/>
+                </a:tc>
+                <a:tc>
+                  <a:txBody>
+                    <a:bodyPr/>
+                    <a:lstStyle/>
+                    <a:p>
+                      <a:r>
+                        <a:rPr lang="en-US" sz="1200" dirty="0" smtClean="0"/>
+                        <a:t>Scheduled</a:t>
+                      </a:r>
+                      <a:endParaRPr lang="en-US" sz="1200" dirty="0"/>
+                    </a:p>
+                  </a:txBody>
+                  <a:tcPr anchor="ctr"/>
+                </a:tc>
+                <a:tc>
+                  <a:txBody>
+                    <a:bodyPr/>
+                    <a:lstStyle/>
+                    <a:p>
+                      <a:pPr algn="l"/>
+                      <a:endParaRPr lang="en-US" sz="1200" dirty="0"/>
+                    </a:p>
+                  </a:txBody>
+                  <a:tcPr anchor="ctr"/>
+                </a:tc>
+              </a:tr>
+              <a:tr h="370840">
+                <a:tc>
+                  <a:txBody>
+                    <a:bodyPr/>
+                    <a:lstStyle/>
+                    <a:p>
+                      <a:pPr algn="l"/>
+                      <a:r>
+                        <a:rPr lang="en-US" sz="1200" dirty="0" smtClean="0"/>
+                        <a:t>8.</a:t>
+                      </a:r>
+                      <a:endParaRPr lang="en-US" sz="1200" dirty="0"/>
+                    </a:p>
+                  </a:txBody>
+                  <a:tcPr anchor="ctr"/>
+                </a:tc>
+                <a:tc>
+                  <a:txBody>
+                    <a:bodyPr/>
+                    <a:lstStyle/>
+                    <a:p>
+                      <a:r>
+                        <a:rPr lang="en-US" sz="1200" smtClean="0"/>
+                        <a:t>Due</a:t>
+                      </a:r>
+                      <a:endParaRPr lang="en-US" sz="1200" dirty="0"/>
+                    </a:p>
+                  </a:txBody>
+                  <a:tcPr anchor="ctr"/>
+                </a:tc>
+                <a:tc>
+                  <a:txBody>
+                    <a:bodyPr/>
+                    <a:lstStyle/>
+                    <a:p>
+                      <a:pPr marL="0" marR="0" indent="0" algn="l" defTabSz="457200" rtl="0" eaLnBrk="1" fontAlgn="auto" latinLnBrk="0" hangingPunct="1">
+                        <a:lnSpc>
+                          <a:spcPct val="100000"/>
+                        </a:lnSpc>
+                        <a:spcBef>
+                          <a:spcPts val="0"/>
+                        </a:spcBef>
+                        <a:spcAft>
+                          <a:spcPts val="0"/>
+                        </a:spcAft>
+                        <a:buClrTx/>
+                        <a:buSzTx/>
+                        <a:buFontTx/>
+                        <a:buNone/>
+                        <a:tabLst/>
+                        <a:defRPr/>
+                      </a:pPr>
+                      <a:r>
+                        <a:rPr lang="en-US" sz="1200" dirty="0" smtClean="0"/>
+                        <a:t>User completes the activity</a:t>
+                      </a:r>
+                    </a:p>
+                  </a:txBody>
+                  <a:tcPr anchor="ctr"/>
+                </a:tc>
+                <a:tc>
+                  <a:txBody>
+                    <a:bodyPr/>
+                    <a:lstStyle/>
+                    <a:p>
+                      <a:r>
+                        <a:rPr lang="en-US" sz="1200" dirty="0" smtClean="0"/>
+                        <a:t>Completed</a:t>
+                      </a:r>
+                      <a:endParaRPr lang="en-US" sz="1200" dirty="0"/>
+                    </a:p>
+                  </a:txBody>
+                  <a:tcPr anchor="ctr"/>
+                </a:tc>
+                <a:tc>
+                  <a:txBody>
+                    <a:bodyPr/>
+                    <a:lstStyle/>
+                    <a:p>
+                      <a:pPr algn="l"/>
+                      <a:endParaRPr lang="en-US" sz="1200" dirty="0"/>
+                    </a:p>
+                  </a:txBody>
+                  <a:tcPr anchor="ctr"/>
+                </a:tc>
+              </a:tr>
+              <a:tr h="370840">
+                <a:tc>
+                  <a:txBody>
+                    <a:bodyPr/>
+                    <a:lstStyle/>
+                    <a:p>
+                      <a:pPr algn="l"/>
+                      <a:r>
+                        <a:rPr lang="en-US" sz="1200" dirty="0" smtClean="0"/>
+                        <a:t>9.</a:t>
+                      </a:r>
+                      <a:endParaRPr lang="en-US" sz="1200" dirty="0"/>
+                    </a:p>
+                  </a:txBody>
+                  <a:tcPr anchor="ctr"/>
+                </a:tc>
+                <a:tc>
+                  <a:txBody>
+                    <a:bodyPr/>
+                    <a:lstStyle/>
+                    <a:p>
+                      <a:r>
+                        <a:rPr lang="en-US" sz="1200" dirty="0" smtClean="0"/>
+                        <a:t>Due</a:t>
+                      </a:r>
+                      <a:endParaRPr lang="en-US" sz="1200" dirty="0"/>
+                    </a:p>
+                  </a:txBody>
+                  <a:tcPr anchor="ctr"/>
+                </a:tc>
+                <a:tc>
+                  <a:txBody>
+                    <a:bodyPr/>
+                    <a:lstStyle/>
+                    <a:p>
+                      <a:pPr marL="0" marR="0" indent="0" algn="l" defTabSz="457200" rtl="0" eaLnBrk="1" fontAlgn="auto" latinLnBrk="0" hangingPunct="1">
+                        <a:lnSpc>
+                          <a:spcPct val="100000"/>
+                        </a:lnSpc>
+                        <a:spcBef>
+                          <a:spcPts val="0"/>
+                        </a:spcBef>
+                        <a:spcAft>
+                          <a:spcPts val="0"/>
+                        </a:spcAft>
+                        <a:buClrTx/>
+                        <a:buSzTx/>
+                        <a:buFontTx/>
+                        <a:buNone/>
+                        <a:tabLst/>
+                        <a:defRPr/>
+                      </a:pPr>
+                      <a:r>
+                        <a:rPr lang="en-US" sz="1200" dirty="0" smtClean="0"/>
+                        <a:t>User changes/delays </a:t>
+                      </a:r>
+                      <a:r>
+                        <a:rPr lang="en-US" sz="1200" baseline="0" dirty="0" err="1" smtClean="0"/>
+                        <a:t>ddayDateTime</a:t>
+                      </a:r>
+                      <a:endParaRPr lang="en-US" sz="1200" dirty="0" smtClean="0"/>
+                    </a:p>
+                  </a:txBody>
+                  <a:tcPr anchor="ctr"/>
+                </a:tc>
+                <a:tc>
+                  <a:txBody>
+                    <a:bodyPr/>
+                    <a:lstStyle/>
+                    <a:p>
+                      <a:r>
+                        <a:rPr lang="en-US" sz="1200" dirty="0" smtClean="0"/>
+                        <a:t>Scheduled</a:t>
+                      </a:r>
+                      <a:endParaRPr lang="en-US" sz="1200" dirty="0"/>
+                    </a:p>
+                  </a:txBody>
+                  <a:tcPr anchor="ctr"/>
+                </a:tc>
+                <a:tc>
+                  <a:txBody>
+                    <a:bodyPr/>
+                    <a:lstStyle/>
+                    <a:p>
+                      <a:pPr algn="l"/>
+                      <a:endParaRPr lang="en-US" sz="1200" dirty="0"/>
+                    </a:p>
+                  </a:txBody>
+                  <a:tcPr anchor="ctr"/>
+                </a:tc>
+              </a:tr>
+              <a:tr h="370840">
+                <a:tc>
+                  <a:txBody>
+                    <a:bodyPr/>
+                    <a:lstStyle/>
+                    <a:p>
+                      <a:pPr algn="l"/>
+                      <a:r>
+                        <a:rPr lang="en-US" sz="1200" dirty="0" smtClean="0"/>
+                        <a:t>10.</a:t>
+                      </a:r>
+                      <a:endParaRPr lang="en-US" sz="1200" dirty="0"/>
+                    </a:p>
+                  </a:txBody>
+                  <a:tcPr anchor="ctr"/>
+                </a:tc>
+                <a:tc>
+                  <a:txBody>
+                    <a:bodyPr/>
+                    <a:lstStyle/>
+                    <a:p>
+                      <a:r>
+                        <a:rPr lang="en-US" sz="1200" dirty="0" smtClean="0"/>
+                        <a:t>Due</a:t>
+                      </a:r>
+                      <a:endParaRPr lang="en-US" sz="1200" dirty="0"/>
+                    </a:p>
+                  </a:txBody>
+                  <a:tcPr anchor="ctr"/>
+                </a:tc>
+                <a:tc>
+                  <a:txBody>
+                    <a:bodyPr/>
+                    <a:lstStyle/>
+                    <a:p>
+                      <a:pPr marL="0" marR="0" indent="0" algn="l" defTabSz="457200" rtl="0" eaLnBrk="1" fontAlgn="auto" latinLnBrk="0" hangingPunct="1">
+                        <a:lnSpc>
+                          <a:spcPct val="100000"/>
+                        </a:lnSpc>
+                        <a:spcBef>
+                          <a:spcPts val="0"/>
+                        </a:spcBef>
+                        <a:spcAft>
+                          <a:spcPts val="0"/>
+                        </a:spcAft>
+                        <a:buClrTx/>
+                        <a:buSzTx/>
+                        <a:buFontTx/>
+                        <a:buNone/>
+                        <a:tabLst/>
+                        <a:defRPr/>
+                      </a:pPr>
+                      <a:r>
+                        <a:rPr lang="en-US" sz="1200" dirty="0" smtClean="0"/>
+                        <a:t>User resets</a:t>
+                      </a:r>
+                      <a:r>
+                        <a:rPr lang="en-US" sz="1200" baseline="0" dirty="0" smtClean="0"/>
+                        <a:t> </a:t>
+                      </a:r>
+                      <a:r>
+                        <a:rPr lang="en-US" sz="1200" baseline="0" dirty="0" err="1" smtClean="0"/>
+                        <a:t>ddayDateTime</a:t>
+                      </a:r>
+                      <a:endParaRPr lang="en-US" sz="1200" dirty="0" smtClean="0"/>
+                    </a:p>
+                  </a:txBody>
+                  <a:tcPr anchor="ctr"/>
+                </a:tc>
+                <a:tc>
+                  <a:txBody>
+                    <a:bodyPr/>
+                    <a:lstStyle/>
+                    <a:p>
+                      <a:pPr marL="0" marR="0" indent="0" algn="l" defTabSz="457200" rtl="0" eaLnBrk="1" fontAlgn="auto" latinLnBrk="0" hangingPunct="1">
+                        <a:lnSpc>
+                          <a:spcPct val="100000"/>
+                        </a:lnSpc>
+                        <a:spcBef>
+                          <a:spcPts val="0"/>
+                        </a:spcBef>
+                        <a:spcAft>
+                          <a:spcPts val="0"/>
+                        </a:spcAft>
+                        <a:buClrTx/>
+                        <a:buSzTx/>
+                        <a:buFontTx/>
+                        <a:buNone/>
+                        <a:tabLst/>
+                        <a:defRPr/>
+                      </a:pPr>
+                      <a:r>
+                        <a:rPr lang="en-US" sz="1200" dirty="0" smtClean="0"/>
+                        <a:t>Not Started</a:t>
+                      </a:r>
+                    </a:p>
+                  </a:txBody>
+                  <a:tcPr anchor="ctr"/>
+                </a:tc>
+                <a:tc>
+                  <a:txBody>
+                    <a:bodyPr/>
+                    <a:lstStyle/>
+                    <a:p>
+                      <a:pPr algn="l"/>
+                      <a:endParaRPr lang="en-US" sz="1200" dirty="0"/>
+                    </a:p>
+                  </a:txBody>
+                  <a:tcPr anchor="ctr"/>
+                </a:tc>
+              </a:tr>
+              <a:tr h="370840">
+                <a:tc>
+                  <a:txBody>
+                    <a:bodyPr/>
+                    <a:lstStyle/>
+                    <a:p>
+                      <a:pPr algn="l"/>
+                      <a:r>
+                        <a:rPr lang="en-US" sz="1200" dirty="0" smtClean="0"/>
+                        <a:t>11.</a:t>
+                      </a:r>
+                      <a:endParaRPr lang="en-US" sz="1200" dirty="0"/>
+                    </a:p>
+                  </a:txBody>
+                  <a:tcPr anchor="ctr"/>
+                </a:tc>
+                <a:tc>
+                  <a:txBody>
+                    <a:bodyPr/>
+                    <a:lstStyle/>
+                    <a:p>
+                      <a:r>
+                        <a:rPr lang="en-US" sz="1200" dirty="0" smtClean="0"/>
+                        <a:t>Completed</a:t>
+                      </a:r>
+                      <a:endParaRPr lang="en-US" sz="1200" dirty="0"/>
+                    </a:p>
+                  </a:txBody>
+                  <a:tcPr anchor="ctr"/>
+                </a:tc>
+                <a:tc>
+                  <a:txBody>
+                    <a:bodyPr/>
+                    <a:lstStyle/>
+                    <a:p>
+                      <a:r>
+                        <a:rPr lang="en-US" sz="1200" dirty="0" smtClean="0"/>
+                        <a:t>Current date &gt; previous</a:t>
+                      </a:r>
+                      <a:r>
+                        <a:rPr lang="en-US" sz="1200" baseline="0" dirty="0" smtClean="0"/>
+                        <a:t> completed </a:t>
+                      </a:r>
+                      <a:r>
+                        <a:rPr lang="en-US" sz="1200" baseline="0" dirty="0" err="1" smtClean="0"/>
+                        <a:t>ddayDate</a:t>
+                      </a:r>
+                      <a:endParaRPr lang="en-US" sz="1200" dirty="0"/>
+                    </a:p>
+                  </a:txBody>
+                  <a:tcPr anchor="ctr"/>
+                </a:tc>
+                <a:tc>
+                  <a:txBody>
+                    <a:bodyPr/>
+                    <a:lstStyle/>
+                    <a:p>
+                      <a:r>
+                        <a:rPr lang="en-US" sz="1200" dirty="0" smtClean="0"/>
+                        <a:t>Scheduled</a:t>
+                      </a:r>
+                      <a:endParaRPr lang="en-US" sz="1200" dirty="0"/>
+                    </a:p>
+                  </a:txBody>
+                  <a:tcPr anchor="ctr"/>
+                </a:tc>
+                <a:tc>
+                  <a:txBody>
+                    <a:bodyPr/>
+                    <a:lstStyle/>
+                    <a:p>
+                      <a:pPr algn="l"/>
+                      <a:endParaRPr lang="en-US" sz="1200" dirty="0"/>
+                    </a:p>
+                  </a:txBody>
+                  <a:tcPr anchor="ctr"/>
+                </a:tc>
+              </a:tr>
+            </a:tbl>
+          </a:graphicData>
+        </a:graphic>
+      </p:graphicFrame>
+    </p:spTree>
+    <p:extLst>
+      <p:ext uri="{BB962C8B-B14F-4D97-AF65-F5344CB8AC3E}">
+        <p14:creationId xmlns:p14="http://schemas.microsoft.com/office/powerpoint/2010/main" val="1055778098"/>
+      </p:ext>
+    </p:extLst>
+  </p:cSld>
+  <p:clrMapOvr>
+    <a:masterClrMapping/>
+  </p:clrMapOvr>
+  <p:timing>
+    <p:tnLst>
+      <p:par>
+        <p:cTn id="1" dur="indefinite" restart="never" nodeType="tmRoot"/>
+      </p:par>
+    </p:tnLst>
+  </p:timing>
+</p:sld>
+</file>
+
+<file path=ppt/slides/slide14.xml><?xml version="1.0" encoding="utf-8"?>
+<p:sld xmlns:a="http://schemas.openxmlformats.org/drawingml/2006/main" xmlns:r="http://schemas.openxmlformats.org/officeDocument/2006/relationships" xmlns:p="http://schemas.openxmlformats.org/presentationml/2006/main">
+  <p:cSld>
+    <p:spTree>
+      <p:nvGrpSpPr>
+        <p:cNvPr id="1" name=""/>
+        <p:cNvGrpSpPr/>
+        <p:nvPr/>
+      </p:nvGrpSpPr>
+      <p:grpSpPr>
+        <a:xfrm>
+          <a:off x="0" y="0"/>
+          <a:ext cx="0" cy="0"/>
+          <a:chOff x="0" y="0"/>
+          <a:chExt cx="0" cy="0"/>
+        </a:xfrm>
+      </p:grpSpPr>
+      <p:sp>
+        <p:nvSpPr>
+          <p:cNvPr id="16" name="Rectangle 15"/>
+          <p:cNvSpPr/>
+          <p:nvPr/>
+        </p:nvSpPr>
+        <p:spPr>
+          <a:xfrm>
+            <a:off x="5188725" y="1540701"/>
+            <a:ext cx="3858016" cy="3444658"/>
+          </a:xfrm>
+          <a:prstGeom prst="rect">
+            <a:avLst/>
+          </a:prstGeom>
+          <a:solidFill>
+            <a:schemeClr val="bg1"/>
+          </a:solidFill>
+        </p:spPr>
+        <p:style>
+          <a:lnRef idx="2">
+            <a:schemeClr val="accent1">
+              <a:shade val="50000"/>
+            </a:schemeClr>
+          </a:lnRef>
+          <a:fillRef idx="1">
+            <a:schemeClr val="accent1"/>
+          </a:fillRef>
+          <a:effectRef idx="0">
+            <a:schemeClr val="accent1"/>
+          </a:effectRef>
+          <a:fontRef idx="minor">
+            <a:schemeClr val="lt1"/>
+          </a:fontRef>
+        </p:style>
+        <p:txBody>
+          <a:bodyPr rtlCol="0" anchor="ctr"/>
+          <a:lstStyle/>
+          <a:p>
+            <a:pPr algn="ctr"/>
+            <a:endParaRPr lang="en-US"/>
+          </a:p>
+        </p:txBody>
+      </p:sp>
+      <p:sp>
+        <p:nvSpPr>
+          <p:cNvPr id="4" name="Rectangle 3"/>
+          <p:cNvSpPr/>
+          <p:nvPr/>
+        </p:nvSpPr>
+        <p:spPr>
+          <a:xfrm>
+            <a:off x="876822" y="1540701"/>
+            <a:ext cx="3858016" cy="3444658"/>
+          </a:xfrm>
+          <a:prstGeom prst="rect">
+            <a:avLst/>
+          </a:prstGeom>
+          <a:solidFill>
+            <a:schemeClr val="bg1"/>
+          </a:solidFill>
+        </p:spPr>
+        <p:style>
+          <a:lnRef idx="2">
+            <a:schemeClr val="accent1">
+              <a:shade val="50000"/>
+            </a:schemeClr>
+          </a:lnRef>
+          <a:fillRef idx="1">
+            <a:schemeClr val="accent1"/>
+          </a:fillRef>
+          <a:effectRef idx="0">
+            <a:schemeClr val="accent1"/>
+          </a:effectRef>
+          <a:fontRef idx="minor">
+            <a:schemeClr val="lt1"/>
+          </a:fontRef>
+        </p:style>
+        <p:txBody>
+          <a:bodyPr rtlCol="0" anchor="ctr"/>
+          <a:lstStyle/>
+          <a:p>
+            <a:pPr algn="ctr"/>
+            <a:endParaRPr lang="en-US"/>
+          </a:p>
+        </p:txBody>
+      </p:sp>
+      <p:sp>
+        <p:nvSpPr>
+          <p:cNvPr id="2" name="Title 1"/>
+          <p:cNvSpPr>
+            <a:spLocks noGrp="1"/>
+          </p:cNvSpPr>
+          <p:nvPr>
+            <p:ph type="title"/>
+          </p:nvPr>
+        </p:nvSpPr>
+        <p:spPr>
+          <a:xfrm>
+            <a:off x="677334" y="609600"/>
+            <a:ext cx="8596668" cy="931101"/>
+          </a:xfrm>
+        </p:spPr>
+        <p:txBody>
+          <a:bodyPr/>
+          <a:lstStyle/>
+          <a:p>
+            <a:r>
+              <a:rPr lang="en-US" dirty="0" smtClean="0"/>
+              <a:t>Interface Design</a:t>
+            </a:r>
+            <a:endParaRPr lang="en-US" dirty="0"/>
+          </a:p>
+        </p:txBody>
+      </p:sp>
+      <p:sp>
+        <p:nvSpPr>
+          <p:cNvPr id="3" name="Rectangle 2"/>
+          <p:cNvSpPr/>
+          <p:nvPr/>
+        </p:nvSpPr>
+        <p:spPr>
+          <a:xfrm>
+            <a:off x="5575989" y="2868459"/>
+            <a:ext cx="1427967" cy="626302"/>
+          </a:xfrm>
+          <a:prstGeom prst="rect">
+            <a:avLst/>
+          </a:prstGeom>
+        </p:spPr>
+        <p:style>
+          <a:lnRef idx="2">
+            <a:schemeClr val="accent1">
+              <a:shade val="50000"/>
+            </a:schemeClr>
+          </a:lnRef>
+          <a:fillRef idx="1">
+            <a:schemeClr val="accent1"/>
+          </a:fillRef>
+          <a:effectRef idx="0">
+            <a:schemeClr val="accent1"/>
+          </a:effectRef>
+          <a:fontRef idx="minor">
+            <a:schemeClr val="lt1"/>
+          </a:fontRef>
+        </p:style>
+        <p:txBody>
+          <a:bodyPr rtlCol="0" anchor="ctr"/>
+          <a:lstStyle/>
+          <a:p>
+            <a:pPr algn="ctr"/>
+            <a:r>
+              <a:rPr lang="en-US" dirty="0" smtClean="0"/>
+              <a:t>Today’s Activities</a:t>
+            </a:r>
+            <a:endParaRPr lang="en-US" dirty="0"/>
+          </a:p>
+        </p:txBody>
+      </p:sp>
+      <p:sp>
+        <p:nvSpPr>
+          <p:cNvPr id="5" name="Rectangle 4"/>
+          <p:cNvSpPr/>
+          <p:nvPr/>
+        </p:nvSpPr>
+        <p:spPr>
+          <a:xfrm>
+            <a:off x="7231512" y="2868459"/>
+            <a:ext cx="1427967" cy="626302"/>
+          </a:xfrm>
+          <a:prstGeom prst="rect">
+            <a:avLst/>
+          </a:prstGeom>
+        </p:spPr>
+        <p:style>
+          <a:lnRef idx="2">
+            <a:schemeClr val="accent1">
+              <a:shade val="50000"/>
+            </a:schemeClr>
+          </a:lnRef>
+          <a:fillRef idx="1">
+            <a:schemeClr val="accent1"/>
+          </a:fillRef>
+          <a:effectRef idx="0">
+            <a:schemeClr val="accent1"/>
+          </a:effectRef>
+          <a:fontRef idx="minor">
+            <a:schemeClr val="lt1"/>
+          </a:fontRef>
+        </p:style>
+        <p:txBody>
+          <a:bodyPr rtlCol="0" anchor="ctr"/>
+          <a:lstStyle/>
+          <a:p>
+            <a:pPr algn="ctr"/>
+            <a:r>
+              <a:rPr lang="en-US" dirty="0"/>
+              <a:t>Activity List</a:t>
+            </a:r>
+            <a:endParaRPr lang="en-US" dirty="0"/>
+          </a:p>
+        </p:txBody>
+      </p:sp>
+      <p:sp>
+        <p:nvSpPr>
+          <p:cNvPr id="7" name="Rectangle 6"/>
+          <p:cNvSpPr/>
+          <p:nvPr/>
+        </p:nvSpPr>
+        <p:spPr>
+          <a:xfrm>
+            <a:off x="7231511" y="3990580"/>
+            <a:ext cx="1427967" cy="387264"/>
+          </a:xfrm>
+          <a:prstGeom prst="rect">
+            <a:avLst/>
+          </a:prstGeom>
+          <a:solidFill>
+            <a:schemeClr val="bg1">
+              <a:lumMod val="65000"/>
+            </a:schemeClr>
+          </a:solidFill>
+        </p:spPr>
+        <p:style>
+          <a:lnRef idx="2">
+            <a:schemeClr val="accent1">
+              <a:shade val="50000"/>
+            </a:schemeClr>
+          </a:lnRef>
+          <a:fillRef idx="1">
+            <a:schemeClr val="accent1"/>
+          </a:fillRef>
+          <a:effectRef idx="0">
+            <a:schemeClr val="accent1"/>
+          </a:effectRef>
+          <a:fontRef idx="minor">
+            <a:schemeClr val="lt1"/>
+          </a:fontRef>
+        </p:style>
+        <p:txBody>
+          <a:bodyPr rtlCol="0" anchor="ctr"/>
+          <a:lstStyle/>
+          <a:p>
+            <a:pPr algn="ctr"/>
+            <a:r>
+              <a:rPr lang="en-US" dirty="0" smtClean="0"/>
+              <a:t>Logout</a:t>
+            </a:r>
+            <a:endParaRPr lang="en-US" dirty="0"/>
+          </a:p>
+        </p:txBody>
+      </p:sp>
+      <p:sp>
+        <p:nvSpPr>
+          <p:cNvPr id="8" name="Rectangle 7"/>
+          <p:cNvSpPr/>
+          <p:nvPr/>
+        </p:nvSpPr>
+        <p:spPr>
+          <a:xfrm>
+            <a:off x="5575989" y="1916482"/>
+            <a:ext cx="3083489" cy="599162"/>
+          </a:xfrm>
+          <a:prstGeom prst="rect">
+            <a:avLst/>
+          </a:prstGeom>
+          <a:solidFill>
+            <a:schemeClr val="bg1"/>
+          </a:solidFill>
+          <a:ln>
+            <a:solidFill>
+              <a:schemeClr val="bg1"/>
+            </a:solidFill>
+          </a:ln>
+        </p:spPr>
+        <p:style>
+          <a:lnRef idx="2">
+            <a:schemeClr val="accent1">
+              <a:shade val="50000"/>
+            </a:schemeClr>
+          </a:lnRef>
+          <a:fillRef idx="1">
+            <a:schemeClr val="accent1"/>
+          </a:fillRef>
+          <a:effectRef idx="0">
+            <a:schemeClr val="accent1"/>
+          </a:effectRef>
+          <a:fontRef idx="minor">
+            <a:schemeClr val="lt1"/>
+          </a:fontRef>
+        </p:style>
+        <p:txBody>
+          <a:bodyPr rtlCol="0" anchor="ctr"/>
+          <a:lstStyle/>
+          <a:p>
+            <a:pPr algn="ctr"/>
+            <a:r>
+              <a:rPr lang="en-US" dirty="0" smtClean="0">
+                <a:solidFill>
+                  <a:schemeClr val="accent2"/>
+                </a:solidFill>
+              </a:rPr>
+              <a:t>Personal Scheduler</a:t>
+            </a:r>
+          </a:p>
+          <a:p>
+            <a:pPr algn="ctr"/>
+            <a:r>
+              <a:rPr lang="en-US" dirty="0" smtClean="0">
+                <a:solidFill>
+                  <a:schemeClr val="accent2"/>
+                </a:solidFill>
+              </a:rPr>
+              <a:t>Monday, 23 March 2020</a:t>
+            </a:r>
+          </a:p>
+          <a:p>
+            <a:pPr algn="ctr"/>
+            <a:r>
+              <a:rPr lang="en-US" dirty="0" smtClean="0">
+                <a:solidFill>
+                  <a:schemeClr val="accent2"/>
+                </a:solidFill>
+              </a:rPr>
+              <a:t>Hello, Bryan.</a:t>
+            </a:r>
+            <a:endParaRPr lang="en-US" dirty="0">
+              <a:solidFill>
+                <a:schemeClr val="accent2"/>
+              </a:solidFill>
+            </a:endParaRPr>
+          </a:p>
+        </p:txBody>
+      </p:sp>
+      <p:sp>
+        <p:nvSpPr>
+          <p:cNvPr id="10" name="Rectangle 9"/>
+          <p:cNvSpPr/>
+          <p:nvPr/>
+        </p:nvSpPr>
+        <p:spPr>
+          <a:xfrm>
+            <a:off x="1267216" y="2851759"/>
+            <a:ext cx="3083489" cy="478077"/>
+          </a:xfrm>
+          <a:prstGeom prst="rect">
+            <a:avLst/>
+          </a:prstGeom>
+          <a:solidFill>
+            <a:schemeClr val="bg1">
+              <a:lumMod val="95000"/>
+            </a:schemeClr>
+          </a:solidFill>
+        </p:spPr>
+        <p:style>
+          <a:lnRef idx="2">
+            <a:schemeClr val="accent1">
+              <a:shade val="50000"/>
+            </a:schemeClr>
+          </a:lnRef>
+          <a:fillRef idx="1">
+            <a:schemeClr val="accent1"/>
+          </a:fillRef>
+          <a:effectRef idx="0">
+            <a:schemeClr val="accent1"/>
+          </a:effectRef>
+          <a:fontRef idx="minor">
+            <a:schemeClr val="lt1"/>
+          </a:fontRef>
+        </p:style>
+        <p:txBody>
+          <a:bodyPr rtlCol="0" anchor="b"/>
+          <a:lstStyle/>
+          <a:p>
+            <a:r>
+              <a:rPr lang="en-US" sz="1600" dirty="0" smtClean="0">
+                <a:solidFill>
+                  <a:schemeClr val="accent2"/>
+                </a:solidFill>
+              </a:rPr>
+              <a:t>Username/email</a:t>
+            </a:r>
+            <a:endParaRPr lang="en-US" sz="1600" dirty="0">
+              <a:solidFill>
+                <a:schemeClr val="accent2"/>
+              </a:solidFill>
+            </a:endParaRPr>
+          </a:p>
+        </p:txBody>
+      </p:sp>
+      <p:sp>
+        <p:nvSpPr>
+          <p:cNvPr id="12" name="Rectangle 11"/>
+          <p:cNvSpPr/>
+          <p:nvPr/>
+        </p:nvSpPr>
+        <p:spPr>
+          <a:xfrm>
+            <a:off x="1267215" y="3512503"/>
+            <a:ext cx="3083489" cy="478077"/>
+          </a:xfrm>
+          <a:prstGeom prst="rect">
+            <a:avLst/>
+          </a:prstGeom>
+          <a:solidFill>
+            <a:schemeClr val="bg1">
+              <a:lumMod val="95000"/>
+            </a:schemeClr>
+          </a:solidFill>
+        </p:spPr>
+        <p:style>
+          <a:lnRef idx="2">
+            <a:schemeClr val="accent1">
+              <a:shade val="50000"/>
+            </a:schemeClr>
+          </a:lnRef>
+          <a:fillRef idx="1">
+            <a:schemeClr val="accent1"/>
+          </a:fillRef>
+          <a:effectRef idx="0">
+            <a:schemeClr val="accent1"/>
+          </a:effectRef>
+          <a:fontRef idx="minor">
+            <a:schemeClr val="lt1"/>
+          </a:fontRef>
+        </p:style>
+        <p:txBody>
+          <a:bodyPr rtlCol="0" anchor="b"/>
+          <a:lstStyle/>
+          <a:p>
+            <a:r>
+              <a:rPr lang="en-US" sz="1600" dirty="0" smtClean="0">
+                <a:solidFill>
+                  <a:schemeClr val="accent2"/>
+                </a:solidFill>
+              </a:rPr>
+              <a:t>Password</a:t>
+            </a:r>
+            <a:endParaRPr lang="en-US" sz="1600" dirty="0">
+              <a:solidFill>
+                <a:schemeClr val="accent2"/>
+              </a:solidFill>
+            </a:endParaRPr>
+          </a:p>
+        </p:txBody>
+      </p:sp>
+      <p:sp>
+        <p:nvSpPr>
+          <p:cNvPr id="13" name="Rectangle 12"/>
+          <p:cNvSpPr/>
+          <p:nvPr/>
+        </p:nvSpPr>
+        <p:spPr>
+          <a:xfrm>
+            <a:off x="1267215" y="4173247"/>
+            <a:ext cx="3083490" cy="486435"/>
+          </a:xfrm>
+          <a:prstGeom prst="rect">
+            <a:avLst/>
+          </a:prstGeom>
+        </p:spPr>
+        <p:style>
+          <a:lnRef idx="2">
+            <a:schemeClr val="accent1">
+              <a:shade val="50000"/>
+            </a:schemeClr>
+          </a:lnRef>
+          <a:fillRef idx="1">
+            <a:schemeClr val="accent1"/>
+          </a:fillRef>
+          <a:effectRef idx="0">
+            <a:schemeClr val="accent1"/>
+          </a:effectRef>
+          <a:fontRef idx="minor">
+            <a:schemeClr val="lt1"/>
+          </a:fontRef>
+        </p:style>
+        <p:txBody>
+          <a:bodyPr rtlCol="0" anchor="ctr"/>
+          <a:lstStyle/>
+          <a:p>
+            <a:pPr algn="ctr"/>
+            <a:r>
+              <a:rPr lang="en-US" dirty="0" smtClean="0"/>
+              <a:t>Login</a:t>
+            </a:r>
+            <a:endParaRPr lang="en-US" dirty="0"/>
+          </a:p>
+        </p:txBody>
+      </p:sp>
+      <p:sp>
+        <p:nvSpPr>
+          <p:cNvPr id="14" name="Rectangle 13"/>
+          <p:cNvSpPr/>
+          <p:nvPr/>
+        </p:nvSpPr>
+        <p:spPr>
+          <a:xfrm>
+            <a:off x="1267216" y="1899782"/>
+            <a:ext cx="3083489" cy="599162"/>
+          </a:xfrm>
+          <a:prstGeom prst="rect">
+            <a:avLst/>
+          </a:prstGeom>
+          <a:solidFill>
+            <a:schemeClr val="bg1"/>
+          </a:solidFill>
+          <a:ln>
+            <a:solidFill>
+              <a:schemeClr val="bg1"/>
+            </a:solidFill>
+          </a:ln>
+        </p:spPr>
+        <p:style>
+          <a:lnRef idx="2">
+            <a:schemeClr val="accent1">
+              <a:shade val="50000"/>
+            </a:schemeClr>
+          </a:lnRef>
+          <a:fillRef idx="1">
+            <a:schemeClr val="accent1"/>
+          </a:fillRef>
+          <a:effectRef idx="0">
+            <a:schemeClr val="accent1"/>
+          </a:effectRef>
+          <a:fontRef idx="minor">
+            <a:schemeClr val="lt1"/>
+          </a:fontRef>
+        </p:style>
+        <p:txBody>
+          <a:bodyPr rtlCol="0" anchor="ctr"/>
+          <a:lstStyle/>
+          <a:p>
+            <a:pPr algn="ctr"/>
+            <a:r>
+              <a:rPr lang="en-US" dirty="0" smtClean="0">
+                <a:solidFill>
+                  <a:schemeClr val="accent2"/>
+                </a:solidFill>
+              </a:rPr>
+              <a:t>Personal Scheduler</a:t>
+            </a:r>
+          </a:p>
+          <a:p>
+            <a:pPr algn="ctr"/>
+            <a:r>
+              <a:rPr lang="en-US" dirty="0" smtClean="0">
+                <a:solidFill>
+                  <a:schemeClr val="accent2"/>
+                </a:solidFill>
+              </a:rPr>
+              <a:t>Monday, 23 March 2020</a:t>
+            </a:r>
+          </a:p>
+          <a:p>
+            <a:pPr algn="ctr"/>
+            <a:r>
+              <a:rPr lang="en-US" dirty="0" smtClean="0">
+                <a:solidFill>
+                  <a:schemeClr val="accent2"/>
+                </a:solidFill>
+              </a:rPr>
+              <a:t>Please login to continue.</a:t>
+            </a:r>
+            <a:endParaRPr lang="en-US" dirty="0">
+              <a:solidFill>
+                <a:schemeClr val="accent2"/>
+              </a:solidFill>
+            </a:endParaRPr>
+          </a:p>
+        </p:txBody>
+      </p:sp>
+    </p:spTree>
+    <p:extLst>
+      <p:ext uri="{BB962C8B-B14F-4D97-AF65-F5344CB8AC3E}">
+        <p14:creationId xmlns:p14="http://schemas.microsoft.com/office/powerpoint/2010/main" val="2289693370"/>
+      </p:ext>
+    </p:extLst>
+  </p:cSld>
+  <p:clrMapOvr>
+    <a:masterClrMapping/>
+  </p:clrMapOvr>
+  <p:timing>
+    <p:tnLst>
+      <p:par>
+        <p:cTn id="1" dur="indefinite" restart="never" nodeType="tmRoot"/>
+      </p:par>
+    </p:tnLst>
+  </p:timing>
+</p:sld>
+</file>
+
+<file path=ppt/slides/slide15.xml><?xml version="1.0" encoding="utf-8"?>
+<p:sld xmlns:a="http://schemas.openxmlformats.org/drawingml/2006/main" xmlns:r="http://schemas.openxmlformats.org/officeDocument/2006/relationships" xmlns:p="http://schemas.openxmlformats.org/presentationml/2006/main">
+  <p:cSld>
+    <p:spTree>
+      <p:nvGrpSpPr>
+        <p:cNvPr id="1" name=""/>
+        <p:cNvGrpSpPr/>
+        <p:nvPr/>
+      </p:nvGrpSpPr>
+      <p:grpSpPr>
+        <a:xfrm>
+          <a:off x="0" y="0"/>
+          <a:ext cx="0" cy="0"/>
+          <a:chOff x="0" y="0"/>
+          <a:chExt cx="0" cy="0"/>
+        </a:xfrm>
+      </p:grpSpPr>
+      <p:sp>
+        <p:nvSpPr>
+          <p:cNvPr id="16" name="Rectangle 15"/>
+          <p:cNvSpPr/>
+          <p:nvPr/>
+        </p:nvSpPr>
+        <p:spPr>
+          <a:xfrm>
+            <a:off x="5188725" y="1540701"/>
+            <a:ext cx="3858016" cy="4847572"/>
+          </a:xfrm>
+          <a:prstGeom prst="rect">
+            <a:avLst/>
+          </a:prstGeom>
+          <a:solidFill>
+            <a:schemeClr val="bg1"/>
+          </a:solidFill>
+        </p:spPr>
+        <p:style>
+          <a:lnRef idx="2">
+            <a:schemeClr val="accent1">
+              <a:shade val="50000"/>
+            </a:schemeClr>
+          </a:lnRef>
+          <a:fillRef idx="1">
+            <a:schemeClr val="accent1"/>
+          </a:fillRef>
+          <a:effectRef idx="0">
+            <a:schemeClr val="accent1"/>
+          </a:effectRef>
+          <a:fontRef idx="minor">
+            <a:schemeClr val="lt1"/>
+          </a:fontRef>
+        </p:style>
+        <p:txBody>
+          <a:bodyPr rtlCol="0" anchor="ctr"/>
+          <a:lstStyle/>
+          <a:p>
+            <a:pPr algn="ctr"/>
+            <a:endParaRPr lang="en-US"/>
+          </a:p>
+        </p:txBody>
+      </p:sp>
+      <p:sp>
+        <p:nvSpPr>
+          <p:cNvPr id="4" name="Rectangle 3"/>
+          <p:cNvSpPr/>
+          <p:nvPr/>
+        </p:nvSpPr>
+        <p:spPr>
+          <a:xfrm>
+            <a:off x="876822" y="1540700"/>
+            <a:ext cx="3858016" cy="4847573"/>
+          </a:xfrm>
+          <a:prstGeom prst="rect">
+            <a:avLst/>
+          </a:prstGeom>
+          <a:solidFill>
+            <a:schemeClr val="bg1"/>
+          </a:solidFill>
+        </p:spPr>
+        <p:style>
+          <a:lnRef idx="2">
+            <a:schemeClr val="accent1">
+              <a:shade val="50000"/>
+            </a:schemeClr>
+          </a:lnRef>
+          <a:fillRef idx="1">
+            <a:schemeClr val="accent1"/>
+          </a:fillRef>
+          <a:effectRef idx="0">
+            <a:schemeClr val="accent1"/>
+          </a:effectRef>
+          <a:fontRef idx="minor">
+            <a:schemeClr val="lt1"/>
+          </a:fontRef>
+        </p:style>
+        <p:txBody>
+          <a:bodyPr rtlCol="0" anchor="ctr"/>
+          <a:lstStyle/>
+          <a:p>
+            <a:pPr algn="ctr"/>
+            <a:endParaRPr lang="en-US"/>
+          </a:p>
+        </p:txBody>
+      </p:sp>
+      <p:sp>
+        <p:nvSpPr>
+          <p:cNvPr id="2" name="Title 1"/>
+          <p:cNvSpPr>
+            <a:spLocks noGrp="1"/>
+          </p:cNvSpPr>
+          <p:nvPr>
+            <p:ph type="title"/>
+          </p:nvPr>
+        </p:nvSpPr>
+        <p:spPr>
+          <a:xfrm>
+            <a:off x="677334" y="609600"/>
+            <a:ext cx="8596668" cy="931101"/>
+          </a:xfrm>
+        </p:spPr>
+        <p:txBody>
+          <a:bodyPr/>
+          <a:lstStyle/>
+          <a:p>
+            <a:r>
+              <a:rPr lang="en-US" dirty="0" smtClean="0"/>
+              <a:t>Interface Design</a:t>
+            </a:r>
+            <a:endParaRPr lang="en-US" dirty="0"/>
+          </a:p>
+        </p:txBody>
+      </p:sp>
+      <p:sp>
+        <p:nvSpPr>
+          <p:cNvPr id="8" name="Rectangle 7"/>
+          <p:cNvSpPr/>
+          <p:nvPr/>
+        </p:nvSpPr>
+        <p:spPr>
+          <a:xfrm>
+            <a:off x="5575989" y="1916482"/>
+            <a:ext cx="3083489" cy="599162"/>
+          </a:xfrm>
+          <a:prstGeom prst="rect">
+            <a:avLst/>
+          </a:prstGeom>
+          <a:solidFill>
+            <a:schemeClr val="bg1"/>
+          </a:solidFill>
+          <a:ln>
+            <a:solidFill>
+              <a:schemeClr val="bg1"/>
+            </a:solidFill>
+          </a:ln>
+        </p:spPr>
+        <p:style>
+          <a:lnRef idx="2">
+            <a:schemeClr val="accent1">
+              <a:shade val="50000"/>
+            </a:schemeClr>
+          </a:lnRef>
+          <a:fillRef idx="1">
+            <a:schemeClr val="accent1"/>
+          </a:fillRef>
+          <a:effectRef idx="0">
+            <a:schemeClr val="accent1"/>
+          </a:effectRef>
+          <a:fontRef idx="minor">
+            <a:schemeClr val="lt1"/>
+          </a:fontRef>
+        </p:style>
+        <p:txBody>
+          <a:bodyPr rtlCol="0" anchor="ctr"/>
+          <a:lstStyle/>
+          <a:p>
+            <a:pPr algn="ctr"/>
+            <a:r>
+              <a:rPr lang="en-US" dirty="0" smtClean="0">
+                <a:solidFill>
+                  <a:schemeClr val="accent2"/>
+                </a:solidFill>
+              </a:rPr>
+              <a:t>Personal Scheduler</a:t>
+            </a:r>
+          </a:p>
+          <a:p>
+            <a:pPr algn="ctr"/>
+            <a:r>
+              <a:rPr lang="en-US" dirty="0" smtClean="0">
+                <a:solidFill>
+                  <a:schemeClr val="accent2"/>
+                </a:solidFill>
+              </a:rPr>
+              <a:t>Monday, 23 March 2020</a:t>
+            </a:r>
+          </a:p>
+          <a:p>
+            <a:pPr algn="ctr"/>
+            <a:r>
+              <a:rPr lang="en-US" dirty="0" smtClean="0">
+                <a:solidFill>
+                  <a:schemeClr val="accent2"/>
+                </a:solidFill>
+              </a:rPr>
+              <a:t>Hello, Bryan.</a:t>
+            </a:r>
+            <a:endParaRPr lang="en-US" dirty="0">
+              <a:solidFill>
+                <a:schemeClr val="accent2"/>
+              </a:solidFill>
+            </a:endParaRPr>
+          </a:p>
+        </p:txBody>
+      </p:sp>
+      <p:sp>
+        <p:nvSpPr>
+          <p:cNvPr id="14" name="Rectangle 13"/>
+          <p:cNvSpPr/>
+          <p:nvPr/>
+        </p:nvSpPr>
+        <p:spPr>
+          <a:xfrm>
+            <a:off x="1267216" y="1899782"/>
+            <a:ext cx="3083489" cy="599162"/>
+          </a:xfrm>
+          <a:prstGeom prst="rect">
+            <a:avLst/>
+          </a:prstGeom>
+          <a:solidFill>
+            <a:schemeClr val="bg1"/>
+          </a:solidFill>
+          <a:ln>
+            <a:solidFill>
+              <a:schemeClr val="bg1"/>
+            </a:solidFill>
+          </a:ln>
+        </p:spPr>
+        <p:style>
+          <a:lnRef idx="2">
+            <a:schemeClr val="accent1">
+              <a:shade val="50000"/>
+            </a:schemeClr>
+          </a:lnRef>
+          <a:fillRef idx="1">
+            <a:schemeClr val="accent1"/>
+          </a:fillRef>
+          <a:effectRef idx="0">
+            <a:schemeClr val="accent1"/>
+          </a:effectRef>
+          <a:fontRef idx="minor">
+            <a:schemeClr val="lt1"/>
+          </a:fontRef>
+        </p:style>
+        <p:txBody>
+          <a:bodyPr rtlCol="0" anchor="ctr"/>
+          <a:lstStyle/>
+          <a:p>
+            <a:pPr algn="ctr"/>
+            <a:r>
+              <a:rPr lang="en-US" dirty="0" smtClean="0">
+                <a:solidFill>
+                  <a:schemeClr val="accent2"/>
+                </a:solidFill>
+              </a:rPr>
+              <a:t>Personal Scheduler</a:t>
+            </a:r>
+          </a:p>
+          <a:p>
+            <a:pPr algn="ctr"/>
+            <a:r>
+              <a:rPr lang="en-US" dirty="0" smtClean="0">
+                <a:solidFill>
+                  <a:schemeClr val="accent2"/>
+                </a:solidFill>
+              </a:rPr>
+              <a:t>Monday, 23 March 2020</a:t>
+            </a:r>
+          </a:p>
+          <a:p>
+            <a:pPr algn="ctr"/>
+            <a:r>
+              <a:rPr lang="en-US" dirty="0" smtClean="0">
+                <a:solidFill>
+                  <a:schemeClr val="accent2"/>
+                </a:solidFill>
+              </a:rPr>
+              <a:t>Please login to continue.</a:t>
+            </a:r>
+            <a:endParaRPr lang="en-US" dirty="0">
+              <a:solidFill>
+                <a:schemeClr val="accent2"/>
+              </a:solidFill>
+            </a:endParaRPr>
+          </a:p>
+        </p:txBody>
+      </p:sp>
+      <p:sp>
+        <p:nvSpPr>
+          <p:cNvPr id="15" name="Rectangle 14"/>
+          <p:cNvSpPr/>
+          <p:nvPr/>
+        </p:nvSpPr>
+        <p:spPr>
+          <a:xfrm>
+            <a:off x="1824534" y="2868459"/>
+            <a:ext cx="1962591" cy="363256"/>
+          </a:xfrm>
+          <a:prstGeom prst="rect">
+            <a:avLst/>
+          </a:prstGeom>
+        </p:spPr>
+        <p:style>
+          <a:lnRef idx="2">
+            <a:schemeClr val="accent1">
+              <a:shade val="50000"/>
+            </a:schemeClr>
+          </a:lnRef>
+          <a:fillRef idx="1">
+            <a:schemeClr val="accent1"/>
+          </a:fillRef>
+          <a:effectRef idx="0">
+            <a:schemeClr val="accent1"/>
+          </a:effectRef>
+          <a:fontRef idx="minor">
+            <a:schemeClr val="lt1"/>
+          </a:fontRef>
+        </p:style>
+        <p:txBody>
+          <a:bodyPr rtlCol="0" anchor="ctr"/>
+          <a:lstStyle/>
+          <a:p>
+            <a:pPr algn="ctr"/>
+            <a:r>
+              <a:rPr lang="en-US" dirty="0" smtClean="0"/>
+              <a:t>Today’s Activities</a:t>
+            </a:r>
+            <a:endParaRPr lang="en-US" dirty="0"/>
+          </a:p>
+        </p:txBody>
+      </p:sp>
+      <p:sp>
+        <p:nvSpPr>
+          <p:cNvPr id="17" name="Rectangle 16"/>
+          <p:cNvSpPr/>
+          <p:nvPr/>
+        </p:nvSpPr>
+        <p:spPr>
+          <a:xfrm>
+            <a:off x="1070183" y="2868459"/>
+            <a:ext cx="658410" cy="363256"/>
+          </a:xfrm>
+          <a:prstGeom prst="rect">
+            <a:avLst/>
+          </a:prstGeom>
+        </p:spPr>
+        <p:style>
+          <a:lnRef idx="2">
+            <a:schemeClr val="accent1">
+              <a:shade val="50000"/>
+            </a:schemeClr>
+          </a:lnRef>
+          <a:fillRef idx="1">
+            <a:schemeClr val="accent1"/>
+          </a:fillRef>
+          <a:effectRef idx="0">
+            <a:schemeClr val="accent1"/>
+          </a:effectRef>
+          <a:fontRef idx="minor">
+            <a:schemeClr val="lt1"/>
+          </a:fontRef>
+        </p:style>
+        <p:txBody>
+          <a:bodyPr rtlCol="0" anchor="ctr"/>
+          <a:lstStyle/>
+          <a:p>
+            <a:pPr algn="ctr"/>
+            <a:r>
+              <a:rPr lang="en-US" dirty="0" smtClean="0"/>
+              <a:t>&lt;</a:t>
+            </a:r>
+            <a:endParaRPr lang="en-US" dirty="0"/>
+          </a:p>
+        </p:txBody>
+      </p:sp>
+      <p:sp>
+        <p:nvSpPr>
+          <p:cNvPr id="18" name="Rectangle 17"/>
+          <p:cNvSpPr/>
+          <p:nvPr/>
+        </p:nvSpPr>
+        <p:spPr>
+          <a:xfrm>
+            <a:off x="3883066" y="2868459"/>
+            <a:ext cx="658410" cy="363256"/>
+          </a:xfrm>
+          <a:prstGeom prst="rect">
+            <a:avLst/>
+          </a:prstGeom>
+        </p:spPr>
+        <p:style>
+          <a:lnRef idx="2">
+            <a:schemeClr val="accent1">
+              <a:shade val="50000"/>
+            </a:schemeClr>
+          </a:lnRef>
+          <a:fillRef idx="1">
+            <a:schemeClr val="accent1"/>
+          </a:fillRef>
+          <a:effectRef idx="0">
+            <a:schemeClr val="accent1"/>
+          </a:effectRef>
+          <a:fontRef idx="minor">
+            <a:schemeClr val="lt1"/>
+          </a:fontRef>
+        </p:style>
+        <p:txBody>
+          <a:bodyPr rtlCol="0" anchor="ctr"/>
+          <a:lstStyle/>
+          <a:p>
+            <a:pPr algn="ctr"/>
+            <a:r>
+              <a:rPr lang="en-US" dirty="0"/>
+              <a:t>&gt;</a:t>
+            </a:r>
+            <a:endParaRPr lang="en-US" dirty="0"/>
+          </a:p>
+        </p:txBody>
+      </p:sp>
+      <p:sp>
+        <p:nvSpPr>
+          <p:cNvPr id="19" name="Rectangle 18"/>
+          <p:cNvSpPr/>
+          <p:nvPr/>
+        </p:nvSpPr>
+        <p:spPr>
+          <a:xfrm>
+            <a:off x="1070183" y="3378895"/>
+            <a:ext cx="3471293" cy="363256"/>
+          </a:xfrm>
+          <a:prstGeom prst="rect">
+            <a:avLst/>
+          </a:prstGeom>
+          <a:solidFill>
+            <a:srgbClr val="C00000"/>
+          </a:solidFill>
+        </p:spPr>
+        <p:style>
+          <a:lnRef idx="2">
+            <a:schemeClr val="accent1">
+              <a:shade val="50000"/>
+            </a:schemeClr>
+          </a:lnRef>
+          <a:fillRef idx="1">
+            <a:schemeClr val="accent1"/>
+          </a:fillRef>
+          <a:effectRef idx="0">
+            <a:schemeClr val="accent1"/>
+          </a:effectRef>
+          <a:fontRef idx="minor">
+            <a:schemeClr val="lt1"/>
+          </a:fontRef>
+        </p:style>
+        <p:txBody>
+          <a:bodyPr rtlCol="0" anchor="ctr"/>
+          <a:lstStyle/>
+          <a:p>
+            <a:pPr algn="ctr"/>
+            <a:r>
+              <a:rPr lang="en-US" dirty="0" smtClean="0"/>
+              <a:t>Buy Shampoo</a:t>
+            </a:r>
+            <a:endParaRPr lang="en-US" dirty="0"/>
+          </a:p>
+        </p:txBody>
+      </p:sp>
+      <p:sp>
+        <p:nvSpPr>
+          <p:cNvPr id="20" name="Rectangle 19"/>
+          <p:cNvSpPr/>
+          <p:nvPr/>
+        </p:nvSpPr>
+        <p:spPr>
+          <a:xfrm>
+            <a:off x="1070183" y="3826702"/>
+            <a:ext cx="3471293" cy="363256"/>
+          </a:xfrm>
+          <a:prstGeom prst="rect">
+            <a:avLst/>
+          </a:prstGeom>
+          <a:solidFill>
+            <a:srgbClr val="FF6600"/>
+          </a:solidFill>
+        </p:spPr>
+        <p:style>
+          <a:lnRef idx="2">
+            <a:schemeClr val="accent1">
+              <a:shade val="50000"/>
+            </a:schemeClr>
+          </a:lnRef>
+          <a:fillRef idx="1">
+            <a:schemeClr val="accent1"/>
+          </a:fillRef>
+          <a:effectRef idx="0">
+            <a:schemeClr val="accent1"/>
+          </a:effectRef>
+          <a:fontRef idx="minor">
+            <a:schemeClr val="lt1"/>
+          </a:fontRef>
+        </p:style>
+        <p:txBody>
+          <a:bodyPr rtlCol="0" anchor="ctr"/>
+          <a:lstStyle/>
+          <a:p>
+            <a:pPr algn="ctr"/>
+            <a:r>
+              <a:rPr lang="en-US" dirty="0" smtClean="0"/>
+              <a:t>Buy Soap</a:t>
+            </a:r>
+            <a:endParaRPr lang="en-US" dirty="0"/>
+          </a:p>
+        </p:txBody>
+      </p:sp>
+      <p:sp>
+        <p:nvSpPr>
+          <p:cNvPr id="21" name="Rectangle 20"/>
+          <p:cNvSpPr/>
+          <p:nvPr/>
+        </p:nvSpPr>
+        <p:spPr>
+          <a:xfrm>
+            <a:off x="1070183" y="4275552"/>
+            <a:ext cx="3471293" cy="363256"/>
+          </a:xfrm>
+          <a:prstGeom prst="rect">
+            <a:avLst/>
+          </a:prstGeom>
+          <a:solidFill>
+            <a:srgbClr val="FFCC00"/>
+          </a:solidFill>
+        </p:spPr>
+        <p:style>
+          <a:lnRef idx="2">
+            <a:schemeClr val="accent1">
+              <a:shade val="50000"/>
+            </a:schemeClr>
+          </a:lnRef>
+          <a:fillRef idx="1">
+            <a:schemeClr val="accent1"/>
+          </a:fillRef>
+          <a:effectRef idx="0">
+            <a:schemeClr val="accent1"/>
+          </a:effectRef>
+          <a:fontRef idx="minor">
+            <a:schemeClr val="lt1"/>
+          </a:fontRef>
+        </p:style>
+        <p:txBody>
+          <a:bodyPr rtlCol="0" anchor="ctr"/>
+          <a:lstStyle/>
+          <a:p>
+            <a:pPr algn="ctr"/>
+            <a:r>
+              <a:rPr lang="en-US" dirty="0" smtClean="0"/>
+              <a:t>Refill Water</a:t>
+            </a:r>
+            <a:endParaRPr lang="en-US" dirty="0"/>
+          </a:p>
+        </p:txBody>
+      </p:sp>
+      <p:sp>
+        <p:nvSpPr>
+          <p:cNvPr id="22" name="Rectangle 21"/>
+          <p:cNvSpPr/>
+          <p:nvPr/>
+        </p:nvSpPr>
+        <p:spPr>
+          <a:xfrm>
+            <a:off x="1070182" y="4724402"/>
+            <a:ext cx="3471293" cy="363256"/>
+          </a:xfrm>
+          <a:prstGeom prst="rect">
+            <a:avLst/>
+          </a:prstGeom>
+          <a:solidFill>
+            <a:srgbClr val="92D050"/>
+          </a:solidFill>
+        </p:spPr>
+        <p:style>
+          <a:lnRef idx="2">
+            <a:schemeClr val="accent1">
+              <a:shade val="50000"/>
+            </a:schemeClr>
+          </a:lnRef>
+          <a:fillRef idx="1">
+            <a:schemeClr val="accent1"/>
+          </a:fillRef>
+          <a:effectRef idx="0">
+            <a:schemeClr val="accent1"/>
+          </a:effectRef>
+          <a:fontRef idx="minor">
+            <a:schemeClr val="lt1"/>
+          </a:fontRef>
+        </p:style>
+        <p:txBody>
+          <a:bodyPr rtlCol="0" anchor="ctr"/>
+          <a:lstStyle/>
+          <a:p>
+            <a:pPr algn="ctr"/>
+            <a:r>
+              <a:rPr lang="en-US" dirty="0" smtClean="0"/>
+              <a:t>Buy Book</a:t>
+            </a:r>
+            <a:endParaRPr lang="en-US" dirty="0"/>
+          </a:p>
+        </p:txBody>
+      </p:sp>
+      <p:sp>
+        <p:nvSpPr>
+          <p:cNvPr id="23" name="Rectangle 22"/>
+          <p:cNvSpPr/>
+          <p:nvPr/>
+        </p:nvSpPr>
+        <p:spPr>
+          <a:xfrm>
+            <a:off x="1070182" y="5172209"/>
+            <a:ext cx="3471293" cy="363256"/>
+          </a:xfrm>
+          <a:prstGeom prst="rect">
+            <a:avLst/>
+          </a:prstGeom>
+          <a:solidFill>
+            <a:srgbClr val="0070C0"/>
+          </a:solidFill>
+        </p:spPr>
+        <p:style>
+          <a:lnRef idx="2">
+            <a:schemeClr val="accent1">
+              <a:shade val="50000"/>
+            </a:schemeClr>
+          </a:lnRef>
+          <a:fillRef idx="1">
+            <a:schemeClr val="accent1"/>
+          </a:fillRef>
+          <a:effectRef idx="0">
+            <a:schemeClr val="accent1"/>
+          </a:effectRef>
+          <a:fontRef idx="minor">
+            <a:schemeClr val="lt1"/>
+          </a:fontRef>
+        </p:style>
+        <p:txBody>
+          <a:bodyPr rtlCol="0" anchor="ctr"/>
+          <a:lstStyle/>
+          <a:p>
+            <a:pPr algn="ctr"/>
+            <a:r>
+              <a:rPr lang="en-US" dirty="0" smtClean="0"/>
+              <a:t>Clean Desk</a:t>
+            </a:r>
+            <a:endParaRPr lang="en-US" dirty="0"/>
+          </a:p>
+        </p:txBody>
+      </p:sp>
+      <p:sp>
+        <p:nvSpPr>
+          <p:cNvPr id="24" name="Rectangle 23"/>
+          <p:cNvSpPr/>
+          <p:nvPr/>
+        </p:nvSpPr>
+        <p:spPr>
+          <a:xfrm>
+            <a:off x="1070182" y="5843390"/>
+            <a:ext cx="3471293" cy="363256"/>
+          </a:xfrm>
+          <a:prstGeom prst="rect">
+            <a:avLst/>
+          </a:prstGeom>
+          <a:solidFill>
+            <a:schemeClr val="bg1">
+              <a:lumMod val="65000"/>
+            </a:schemeClr>
+          </a:solidFill>
+        </p:spPr>
+        <p:style>
+          <a:lnRef idx="2">
+            <a:schemeClr val="accent1">
+              <a:shade val="50000"/>
+            </a:schemeClr>
+          </a:lnRef>
+          <a:fillRef idx="1">
+            <a:schemeClr val="accent1"/>
+          </a:fillRef>
+          <a:effectRef idx="0">
+            <a:schemeClr val="accent1"/>
+          </a:effectRef>
+          <a:fontRef idx="minor">
+            <a:schemeClr val="lt1"/>
+          </a:fontRef>
+        </p:style>
+        <p:txBody>
+          <a:bodyPr rtlCol="0" anchor="ctr"/>
+          <a:lstStyle/>
+          <a:p>
+            <a:pPr algn="ctr"/>
+            <a:r>
+              <a:rPr lang="en-US" dirty="0" smtClean="0"/>
+              <a:t>Home</a:t>
+            </a:r>
+            <a:endParaRPr lang="en-US" dirty="0"/>
+          </a:p>
+        </p:txBody>
+      </p:sp>
+      <p:sp>
+        <p:nvSpPr>
+          <p:cNvPr id="25" name="Rectangle 24"/>
+          <p:cNvSpPr/>
+          <p:nvPr/>
+        </p:nvSpPr>
+        <p:spPr>
+          <a:xfrm>
+            <a:off x="5382086" y="5843390"/>
+            <a:ext cx="3471293" cy="363256"/>
+          </a:xfrm>
+          <a:prstGeom prst="rect">
+            <a:avLst/>
+          </a:prstGeom>
+          <a:solidFill>
+            <a:schemeClr val="bg1">
+              <a:lumMod val="65000"/>
+            </a:schemeClr>
+          </a:solidFill>
+        </p:spPr>
+        <p:style>
+          <a:lnRef idx="2">
+            <a:schemeClr val="accent1">
+              <a:shade val="50000"/>
+            </a:schemeClr>
+          </a:lnRef>
+          <a:fillRef idx="1">
+            <a:schemeClr val="accent1"/>
+          </a:fillRef>
+          <a:effectRef idx="0">
+            <a:schemeClr val="accent1"/>
+          </a:effectRef>
+          <a:fontRef idx="minor">
+            <a:schemeClr val="lt1"/>
+          </a:fontRef>
+        </p:style>
+        <p:txBody>
+          <a:bodyPr rtlCol="0" anchor="ctr"/>
+          <a:lstStyle/>
+          <a:p>
+            <a:pPr algn="ctr"/>
+            <a:r>
+              <a:rPr lang="en-US" dirty="0" smtClean="0"/>
+              <a:t>Home</a:t>
+            </a:r>
+            <a:endParaRPr lang="en-US" dirty="0"/>
+          </a:p>
+        </p:txBody>
+      </p:sp>
+      <p:sp>
+        <p:nvSpPr>
+          <p:cNvPr id="26" name="Rectangle 25"/>
+          <p:cNvSpPr/>
+          <p:nvPr/>
+        </p:nvSpPr>
+        <p:spPr>
+          <a:xfrm>
+            <a:off x="5382085" y="2867415"/>
+            <a:ext cx="1682593" cy="363256"/>
+          </a:xfrm>
+          <a:prstGeom prst="rect">
+            <a:avLst/>
+          </a:prstGeom>
+        </p:spPr>
+        <p:style>
+          <a:lnRef idx="2">
+            <a:schemeClr val="accent1">
+              <a:shade val="50000"/>
+            </a:schemeClr>
+          </a:lnRef>
+          <a:fillRef idx="1">
+            <a:schemeClr val="accent1"/>
+          </a:fillRef>
+          <a:effectRef idx="0">
+            <a:schemeClr val="accent1"/>
+          </a:effectRef>
+          <a:fontRef idx="minor">
+            <a:schemeClr val="lt1"/>
+          </a:fontRef>
+        </p:style>
+        <p:txBody>
+          <a:bodyPr rtlCol="0" anchor="ctr"/>
+          <a:lstStyle/>
+          <a:p>
+            <a:pPr algn="ctr"/>
+            <a:r>
+              <a:rPr lang="en-US" dirty="0" smtClean="0"/>
+              <a:t>Add Activity</a:t>
+            </a:r>
+            <a:endParaRPr lang="en-US" dirty="0"/>
+          </a:p>
+        </p:txBody>
+      </p:sp>
+      <p:sp>
+        <p:nvSpPr>
+          <p:cNvPr id="27" name="Rectangle 26"/>
+          <p:cNvSpPr/>
+          <p:nvPr/>
+        </p:nvSpPr>
+        <p:spPr>
+          <a:xfrm>
+            <a:off x="7258038" y="2867415"/>
+            <a:ext cx="1595341" cy="363256"/>
+          </a:xfrm>
+          <a:prstGeom prst="rect">
+            <a:avLst/>
+          </a:prstGeom>
+        </p:spPr>
+        <p:style>
+          <a:lnRef idx="2">
+            <a:schemeClr val="accent1">
+              <a:shade val="50000"/>
+            </a:schemeClr>
+          </a:lnRef>
+          <a:fillRef idx="1">
+            <a:schemeClr val="accent1"/>
+          </a:fillRef>
+          <a:effectRef idx="0">
+            <a:schemeClr val="accent1"/>
+          </a:effectRef>
+          <a:fontRef idx="minor">
+            <a:schemeClr val="lt1"/>
+          </a:fontRef>
+        </p:style>
+        <p:txBody>
+          <a:bodyPr rtlCol="0" anchor="ctr"/>
+          <a:lstStyle/>
+          <a:p>
+            <a:pPr algn="ctr"/>
+            <a:r>
+              <a:rPr lang="en-US" dirty="0" smtClean="0"/>
+              <a:t>Filter</a:t>
+            </a:r>
+            <a:endParaRPr lang="en-US" dirty="0"/>
+          </a:p>
+        </p:txBody>
+      </p:sp>
+      <p:sp>
+        <p:nvSpPr>
+          <p:cNvPr id="28" name="Rectangle 27"/>
+          <p:cNvSpPr/>
+          <p:nvPr/>
+        </p:nvSpPr>
+        <p:spPr>
+          <a:xfrm>
+            <a:off x="5382085" y="3378895"/>
+            <a:ext cx="3471293" cy="363256"/>
+          </a:xfrm>
+          <a:prstGeom prst="rect">
+            <a:avLst/>
+          </a:prstGeom>
+          <a:solidFill>
+            <a:srgbClr val="00B050"/>
+          </a:solidFill>
+        </p:spPr>
+        <p:style>
+          <a:lnRef idx="2">
+            <a:schemeClr val="accent1">
+              <a:shade val="50000"/>
+            </a:schemeClr>
+          </a:lnRef>
+          <a:fillRef idx="1">
+            <a:schemeClr val="accent1"/>
+          </a:fillRef>
+          <a:effectRef idx="0">
+            <a:schemeClr val="accent1"/>
+          </a:effectRef>
+          <a:fontRef idx="minor">
+            <a:schemeClr val="lt1"/>
+          </a:fontRef>
+        </p:style>
+        <p:txBody>
+          <a:bodyPr rtlCol="0" anchor="ctr"/>
+          <a:lstStyle/>
+          <a:p>
+            <a:pPr algn="ctr"/>
+            <a:r>
+              <a:rPr lang="en-US" dirty="0" smtClean="0"/>
+              <a:t>Buy Shampoo</a:t>
+            </a:r>
+            <a:endParaRPr lang="en-US" dirty="0"/>
+          </a:p>
+        </p:txBody>
+      </p:sp>
+      <p:sp>
+        <p:nvSpPr>
+          <p:cNvPr id="30" name="Rectangle 29"/>
+          <p:cNvSpPr/>
+          <p:nvPr/>
+        </p:nvSpPr>
+        <p:spPr>
+          <a:xfrm>
+            <a:off x="5382085" y="3826702"/>
+            <a:ext cx="3471293" cy="363256"/>
+          </a:xfrm>
+          <a:prstGeom prst="rect">
+            <a:avLst/>
+          </a:prstGeom>
+          <a:solidFill>
+            <a:srgbClr val="00B050"/>
+          </a:solidFill>
+        </p:spPr>
+        <p:style>
+          <a:lnRef idx="2">
+            <a:schemeClr val="accent1">
+              <a:shade val="50000"/>
+            </a:schemeClr>
+          </a:lnRef>
+          <a:fillRef idx="1">
+            <a:schemeClr val="accent1"/>
+          </a:fillRef>
+          <a:effectRef idx="0">
+            <a:schemeClr val="accent1"/>
+          </a:effectRef>
+          <a:fontRef idx="minor">
+            <a:schemeClr val="lt1"/>
+          </a:fontRef>
+        </p:style>
+        <p:txBody>
+          <a:bodyPr rtlCol="0" anchor="ctr"/>
+          <a:lstStyle/>
+          <a:p>
+            <a:pPr algn="ctr"/>
+            <a:r>
+              <a:rPr lang="en-US" dirty="0" smtClean="0"/>
+              <a:t>Buy Soap</a:t>
+            </a:r>
+            <a:endParaRPr lang="en-US" dirty="0"/>
+          </a:p>
+        </p:txBody>
+      </p:sp>
+      <p:sp>
+        <p:nvSpPr>
+          <p:cNvPr id="31" name="Rectangle 30"/>
+          <p:cNvSpPr/>
+          <p:nvPr/>
+        </p:nvSpPr>
+        <p:spPr>
+          <a:xfrm>
+            <a:off x="5382085" y="4275552"/>
+            <a:ext cx="3471293" cy="363256"/>
+          </a:xfrm>
+          <a:prstGeom prst="rect">
+            <a:avLst/>
+          </a:prstGeom>
+          <a:solidFill>
+            <a:srgbClr val="00B050"/>
+          </a:solidFill>
+        </p:spPr>
+        <p:style>
+          <a:lnRef idx="2">
+            <a:schemeClr val="accent1">
+              <a:shade val="50000"/>
+            </a:schemeClr>
+          </a:lnRef>
+          <a:fillRef idx="1">
+            <a:schemeClr val="accent1"/>
+          </a:fillRef>
+          <a:effectRef idx="0">
+            <a:schemeClr val="accent1"/>
+          </a:effectRef>
+          <a:fontRef idx="minor">
+            <a:schemeClr val="lt1"/>
+          </a:fontRef>
+        </p:style>
+        <p:txBody>
+          <a:bodyPr rtlCol="0" anchor="ctr"/>
+          <a:lstStyle/>
+          <a:p>
+            <a:pPr algn="ctr"/>
+            <a:r>
+              <a:rPr lang="en-US" dirty="0" smtClean="0"/>
+              <a:t>Refill Water</a:t>
+            </a:r>
+            <a:endParaRPr lang="en-US" dirty="0"/>
+          </a:p>
+        </p:txBody>
+      </p:sp>
+      <p:sp>
+        <p:nvSpPr>
+          <p:cNvPr id="32" name="Rectangle 31"/>
+          <p:cNvSpPr/>
+          <p:nvPr/>
+        </p:nvSpPr>
+        <p:spPr>
+          <a:xfrm>
+            <a:off x="5382084" y="4724402"/>
+            <a:ext cx="3471293" cy="363256"/>
+          </a:xfrm>
+          <a:prstGeom prst="rect">
+            <a:avLst/>
+          </a:prstGeom>
+          <a:solidFill>
+            <a:schemeClr val="bg1">
+              <a:lumMod val="50000"/>
+            </a:schemeClr>
+          </a:solidFill>
+        </p:spPr>
+        <p:style>
+          <a:lnRef idx="2">
+            <a:schemeClr val="accent1">
+              <a:shade val="50000"/>
+            </a:schemeClr>
+          </a:lnRef>
+          <a:fillRef idx="1">
+            <a:schemeClr val="accent1"/>
+          </a:fillRef>
+          <a:effectRef idx="0">
+            <a:schemeClr val="accent1"/>
+          </a:effectRef>
+          <a:fontRef idx="minor">
+            <a:schemeClr val="lt1"/>
+          </a:fontRef>
+        </p:style>
+        <p:txBody>
+          <a:bodyPr rtlCol="0" anchor="ctr"/>
+          <a:lstStyle/>
+          <a:p>
+            <a:pPr algn="ctr"/>
+            <a:r>
+              <a:rPr lang="en-US" dirty="0" smtClean="0"/>
+              <a:t>Buy Book</a:t>
+            </a:r>
+            <a:endParaRPr lang="en-US" dirty="0"/>
+          </a:p>
+        </p:txBody>
+      </p:sp>
+      <p:sp>
+        <p:nvSpPr>
+          <p:cNvPr id="33" name="Rectangle 32"/>
+          <p:cNvSpPr/>
+          <p:nvPr/>
+        </p:nvSpPr>
+        <p:spPr>
+          <a:xfrm>
+            <a:off x="5382084" y="5172209"/>
+            <a:ext cx="3471293" cy="363256"/>
+          </a:xfrm>
+          <a:prstGeom prst="rect">
+            <a:avLst/>
+          </a:prstGeom>
+          <a:solidFill>
+            <a:srgbClr val="C00000"/>
+          </a:solidFill>
+        </p:spPr>
+        <p:style>
+          <a:lnRef idx="2">
+            <a:schemeClr val="accent1">
+              <a:shade val="50000"/>
+            </a:schemeClr>
+          </a:lnRef>
+          <a:fillRef idx="1">
+            <a:schemeClr val="accent1"/>
+          </a:fillRef>
+          <a:effectRef idx="0">
+            <a:schemeClr val="accent1"/>
+          </a:effectRef>
+          <a:fontRef idx="minor">
+            <a:schemeClr val="lt1"/>
+          </a:fontRef>
+        </p:style>
+        <p:txBody>
+          <a:bodyPr rtlCol="0" anchor="ctr"/>
+          <a:lstStyle/>
+          <a:p>
+            <a:pPr algn="ctr"/>
+            <a:r>
+              <a:rPr lang="en-US" dirty="0" smtClean="0"/>
+              <a:t>Clean Desk</a:t>
+            </a:r>
+            <a:endParaRPr lang="en-US" dirty="0"/>
+          </a:p>
+        </p:txBody>
+      </p:sp>
+    </p:spTree>
+    <p:extLst>
+      <p:ext uri="{BB962C8B-B14F-4D97-AF65-F5344CB8AC3E}">
+        <p14:creationId xmlns:p14="http://schemas.microsoft.com/office/powerpoint/2010/main" val="2618858444"/>
       </p:ext>
     </p:extLst>
   </p:cSld>

</xml_diff>